<commit_message>
final draft of powerpoint
</commit_message>
<xml_diff>
--- a/Presentation/4MinSpeech.pptx
+++ b/Presentation/4MinSpeech.pptx
@@ -4,13 +4,17 @@
   <p:sldMasterIdLst>
     <p:sldMasterId id="2147483648" r:id="rId1"/>
   </p:sldMasterIdLst>
+  <p:notesMasterIdLst>
+    <p:notesMasterId r:id="rId9"/>
+  </p:notesMasterIdLst>
   <p:sldIdLst>
     <p:sldId id="263" r:id="rId2"/>
     <p:sldId id="256" r:id="rId3"/>
-    <p:sldId id="262" r:id="rId4"/>
-    <p:sldId id="261" r:id="rId5"/>
-    <p:sldId id="264" r:id="rId6"/>
-    <p:sldId id="265" r:id="rId7"/>
+    <p:sldId id="261" r:id="rId4"/>
+    <p:sldId id="264" r:id="rId5"/>
+    <p:sldId id="265" r:id="rId6"/>
+    <p:sldId id="266" r:id="rId7"/>
+    <p:sldId id="269" r:id="rId8"/>
   </p:sldIdLst>
   <p:sldSz cx="12192000" cy="6858000"/>
   <p:notesSz cx="6858000" cy="9144000"/>
@@ -109,7 +113,2313 @@
       </a:defRPr>
     </a:lvl9pPr>
   </p:defaultTextStyle>
+  <p:extLst>
+    <p:ext uri="{EFAFB233-063F-42B5-8137-9DF3F51BA10A}">
+      <p15:sldGuideLst xmlns:p15="http://schemas.microsoft.com/office/powerpoint/2012/main"/>
+    </p:ext>
+  </p:extLst>
 </p:presentation>
+</file>
+
+<file path=ppt/notesMasters/notesMaster1.xml><?xml version="1.0" encoding="utf-8"?>
+<p:notesMaster xmlns:a="http://schemas.openxmlformats.org/drawingml/2006/main" xmlns:r="http://schemas.openxmlformats.org/officeDocument/2006/relationships" xmlns:p="http://schemas.openxmlformats.org/presentationml/2006/main">
+  <p:cSld>
+    <p:bg>
+      <p:bgRef idx="1001">
+        <a:schemeClr val="bg1"/>
+      </p:bgRef>
+    </p:bg>
+    <p:spTree>
+      <p:nvGrpSpPr>
+        <p:cNvPr id="1" name=""/>
+        <p:cNvGrpSpPr/>
+        <p:nvPr/>
+      </p:nvGrpSpPr>
+      <p:grpSpPr>
+        <a:xfrm>
+          <a:off x="0" y="0"/>
+          <a:ext cx="0" cy="0"/>
+          <a:chOff x="0" y="0"/>
+          <a:chExt cx="0" cy="0"/>
+        </a:xfrm>
+      </p:grpSpPr>
+      <p:sp>
+        <p:nvSpPr>
+          <p:cNvPr id="2" name="Header Placeholder 1">
+            <a:extLst>
+              <a:ext uri="{FF2B5EF4-FFF2-40B4-BE49-F238E27FC236}">
+                <a16:creationId xmlns:a16="http://schemas.microsoft.com/office/drawing/2014/main" id="{CFAB96ED-1A5F-46D7-9690-CC9BFCBEC32F}"/>
+              </a:ext>
+            </a:extLst>
+          </p:cNvPr>
+          <p:cNvSpPr>
+            <a:spLocks noGrp="1"/>
+          </p:cNvSpPr>
+          <p:nvPr>
+            <p:ph type="hdr" sz="quarter"/>
+          </p:nvPr>
+        </p:nvSpPr>
+        <p:spPr>
+          <a:xfrm>
+            <a:off x="0" y="0"/>
+            <a:ext cx="2971800" cy="458788"/>
+          </a:xfrm>
+          <a:prstGeom prst="rect">
+            <a:avLst/>
+          </a:prstGeom>
+        </p:spPr>
+        <p:txBody>
+          <a:bodyPr vert="horz" lIns="91440" tIns="45720" rIns="91440" bIns="45720" rtlCol="0"/>
+          <a:lstStyle>
+            <a:lvl1pPr algn="l">
+              <a:defRPr sz="1200"/>
+            </a:lvl1pPr>
+          </a:lstStyle>
+          <a:p>
+            <a:endParaRPr lang="en-AU"/>
+          </a:p>
+        </p:txBody>
+      </p:sp>
+      <p:sp>
+        <p:nvSpPr>
+          <p:cNvPr id="3" name="Date Placeholder 2">
+            <a:extLst>
+              <a:ext uri="{FF2B5EF4-FFF2-40B4-BE49-F238E27FC236}">
+                <a16:creationId xmlns:a16="http://schemas.microsoft.com/office/drawing/2014/main" id="{26DC0C1D-9016-4FE7-B857-52A00E167B70}"/>
+              </a:ext>
+            </a:extLst>
+          </p:cNvPr>
+          <p:cNvSpPr>
+            <a:spLocks noGrp="1"/>
+          </p:cNvSpPr>
+          <p:nvPr>
+            <p:ph type="dt" idx="1"/>
+          </p:nvPr>
+        </p:nvSpPr>
+        <p:spPr>
+          <a:xfrm>
+            <a:off x="3884613" y="0"/>
+            <a:ext cx="2971800" cy="458788"/>
+          </a:xfrm>
+          <a:prstGeom prst="rect">
+            <a:avLst/>
+          </a:prstGeom>
+        </p:spPr>
+        <p:txBody>
+          <a:bodyPr vert="horz" lIns="91440" tIns="45720" rIns="91440" bIns="45720" rtlCol="0"/>
+          <a:lstStyle>
+            <a:lvl1pPr algn="r">
+              <a:defRPr sz="1200"/>
+            </a:lvl1pPr>
+          </a:lstStyle>
+          <a:p>
+            <a:fld id="{58A58D8C-FE11-416C-AA0E-8FBEA4869F41}" type="datetimeFigureOut">
+              <a:rPr lang="en-AU" smtClean="0"/>
+              <a:t>14/06/2020</a:t>
+            </a:fld>
+            <a:endParaRPr lang="en-AU"/>
+          </a:p>
+        </p:txBody>
+      </p:sp>
+      <p:sp>
+        <p:nvSpPr>
+          <p:cNvPr id="4" name="Slide Image Placeholder 3">
+            <a:extLst>
+              <a:ext uri="{FF2B5EF4-FFF2-40B4-BE49-F238E27FC236}">
+                <a16:creationId xmlns:a16="http://schemas.microsoft.com/office/drawing/2014/main" id="{E24A7934-D4F4-40DE-9E9D-CE61AA102E26}"/>
+              </a:ext>
+            </a:extLst>
+          </p:cNvPr>
+          <p:cNvSpPr>
+            <a:spLocks noGrp="1" noRot="1" noChangeAspect="1"/>
+          </p:cNvSpPr>
+          <p:nvPr>
+            <p:ph type="sldImg" idx="2"/>
+          </p:nvPr>
+        </p:nvSpPr>
+        <p:spPr>
+          <a:xfrm>
+            <a:off x="685800" y="1143000"/>
+            <a:ext cx="5486400" cy="3086100"/>
+          </a:xfrm>
+          <a:prstGeom prst="rect">
+            <a:avLst/>
+          </a:prstGeom>
+          <a:noFill/>
+          <a:ln w="12700">
+            <a:solidFill>
+              <a:prstClr val="black"/>
+            </a:solidFill>
+          </a:ln>
+        </p:spPr>
+        <p:txBody>
+          <a:bodyPr vert="horz" lIns="91440" tIns="45720" rIns="91440" bIns="45720" rtlCol="0" anchor="ctr"/>
+          <a:lstStyle/>
+          <a:p>
+            <a:endParaRPr lang="en-AU"/>
+          </a:p>
+        </p:txBody>
+      </p:sp>
+      <p:sp>
+        <p:nvSpPr>
+          <p:cNvPr id="5" name="Notes Placeholder 4">
+            <a:extLst>
+              <a:ext uri="{FF2B5EF4-FFF2-40B4-BE49-F238E27FC236}">
+                <a16:creationId xmlns:a16="http://schemas.microsoft.com/office/drawing/2014/main" id="{2FEEDEC0-7648-488B-AF82-542BBDBB5114}"/>
+              </a:ext>
+            </a:extLst>
+          </p:cNvPr>
+          <p:cNvSpPr>
+            <a:spLocks noGrp="1"/>
+          </p:cNvSpPr>
+          <p:nvPr>
+            <p:ph type="body" sz="quarter" idx="3"/>
+          </p:nvPr>
+        </p:nvSpPr>
+        <p:spPr>
+          <a:xfrm>
+            <a:off x="685800" y="4400550"/>
+            <a:ext cx="5486400" cy="3600450"/>
+          </a:xfrm>
+          <a:prstGeom prst="rect">
+            <a:avLst/>
+          </a:prstGeom>
+        </p:spPr>
+        <p:txBody>
+          <a:bodyPr vert="horz" lIns="91440" tIns="45720" rIns="91440" bIns="45720" rtlCol="0"/>
+          <a:lstStyle/>
+          <a:p>
+            <a:pPr lvl="0"/>
+            <a:r>
+              <a:rPr lang="en-US"/>
+              <a:t>Click to edit Master text styles</a:t>
+            </a:r>
+          </a:p>
+          <a:p>
+            <a:pPr lvl="1"/>
+            <a:r>
+              <a:rPr lang="en-US"/>
+              <a:t>Second level</a:t>
+            </a:r>
+          </a:p>
+          <a:p>
+            <a:pPr lvl="2"/>
+            <a:r>
+              <a:rPr lang="en-US"/>
+              <a:t>Third level</a:t>
+            </a:r>
+          </a:p>
+          <a:p>
+            <a:pPr lvl="3"/>
+            <a:r>
+              <a:rPr lang="en-US"/>
+              <a:t>Fourth level</a:t>
+            </a:r>
+          </a:p>
+          <a:p>
+            <a:pPr lvl="4"/>
+            <a:r>
+              <a:rPr lang="en-US"/>
+              <a:t>Fifth level</a:t>
+            </a:r>
+            <a:endParaRPr lang="en-AU"/>
+          </a:p>
+        </p:txBody>
+      </p:sp>
+      <p:sp>
+        <p:nvSpPr>
+          <p:cNvPr id="6" name="Footer Placeholder 5">
+            <a:extLst>
+              <a:ext uri="{FF2B5EF4-FFF2-40B4-BE49-F238E27FC236}">
+                <a16:creationId xmlns:a16="http://schemas.microsoft.com/office/drawing/2014/main" id="{195D8CCC-EB31-4393-843A-09FBF943AF10}"/>
+              </a:ext>
+            </a:extLst>
+          </p:cNvPr>
+          <p:cNvSpPr>
+            <a:spLocks noGrp="1"/>
+          </p:cNvSpPr>
+          <p:nvPr>
+            <p:ph type="ftr" sz="quarter" idx="4"/>
+          </p:nvPr>
+        </p:nvSpPr>
+        <p:spPr>
+          <a:xfrm>
+            <a:off x="0" y="8685213"/>
+            <a:ext cx="2971800" cy="458787"/>
+          </a:xfrm>
+          <a:prstGeom prst="rect">
+            <a:avLst/>
+          </a:prstGeom>
+        </p:spPr>
+        <p:txBody>
+          <a:bodyPr vert="horz" lIns="91440" tIns="45720" rIns="91440" bIns="45720" rtlCol="0" anchor="b"/>
+          <a:lstStyle>
+            <a:lvl1pPr algn="l">
+              <a:defRPr sz="1200"/>
+            </a:lvl1pPr>
+          </a:lstStyle>
+          <a:p>
+            <a:endParaRPr lang="en-AU"/>
+          </a:p>
+        </p:txBody>
+      </p:sp>
+      <p:sp>
+        <p:nvSpPr>
+          <p:cNvPr id="7" name="Slide Number Placeholder 6">
+            <a:extLst>
+              <a:ext uri="{FF2B5EF4-FFF2-40B4-BE49-F238E27FC236}">
+                <a16:creationId xmlns:a16="http://schemas.microsoft.com/office/drawing/2014/main" id="{507A136E-4E53-4886-81B4-9E6B579CBC4E}"/>
+              </a:ext>
+            </a:extLst>
+          </p:cNvPr>
+          <p:cNvSpPr>
+            <a:spLocks noGrp="1"/>
+          </p:cNvSpPr>
+          <p:nvPr>
+            <p:ph type="sldNum" sz="quarter" idx="5"/>
+          </p:nvPr>
+        </p:nvSpPr>
+        <p:spPr>
+          <a:xfrm>
+            <a:off x="3884613" y="8685213"/>
+            <a:ext cx="2971800" cy="458787"/>
+          </a:xfrm>
+          <a:prstGeom prst="rect">
+            <a:avLst/>
+          </a:prstGeom>
+        </p:spPr>
+        <p:txBody>
+          <a:bodyPr vert="horz" lIns="91440" tIns="45720" rIns="91440" bIns="45720" rtlCol="0" anchor="b"/>
+          <a:lstStyle>
+            <a:lvl1pPr algn="r">
+              <a:defRPr sz="1200"/>
+            </a:lvl1pPr>
+          </a:lstStyle>
+          <a:p>
+            <a:fld id="{1161460B-3110-41F7-A27C-C3E35BF4C26E}" type="slidenum">
+              <a:rPr lang="en-AU" smtClean="0"/>
+              <a:t>‹#›</a:t>
+            </a:fld>
+            <a:endParaRPr lang="en-AU"/>
+          </a:p>
+        </p:txBody>
+      </p:sp>
+    </p:spTree>
+  </p:cSld>
+  <p:clrMap bg1="lt1" tx1="dk1" bg2="lt2" tx2="dk2" accent1="accent1" accent2="accent2" accent3="accent3" accent4="accent4" accent5="accent5" accent6="accent6" hlink="hlink" folHlink="folHlink"/>
+  <p:notesStyle>
+    <a:lvl1pPr marL="0" algn="l" defTabSz="914400" rtl="0" eaLnBrk="1" latinLnBrk="0" hangingPunct="1">
+      <a:defRPr sz="1200" kern="1200">
+        <a:solidFill>
+          <a:schemeClr val="tx1"/>
+        </a:solidFill>
+        <a:latin typeface="+mn-lt"/>
+        <a:ea typeface="+mn-ea"/>
+        <a:cs typeface="+mn-cs"/>
+      </a:defRPr>
+    </a:lvl1pPr>
+    <a:lvl2pPr marL="457200" algn="l" defTabSz="914400" rtl="0" eaLnBrk="1" latinLnBrk="0" hangingPunct="1">
+      <a:defRPr sz="1200" kern="1200">
+        <a:solidFill>
+          <a:schemeClr val="tx1"/>
+        </a:solidFill>
+        <a:latin typeface="+mn-lt"/>
+        <a:ea typeface="+mn-ea"/>
+        <a:cs typeface="+mn-cs"/>
+      </a:defRPr>
+    </a:lvl2pPr>
+    <a:lvl3pPr marL="914400" algn="l" defTabSz="914400" rtl="0" eaLnBrk="1" latinLnBrk="0" hangingPunct="1">
+      <a:defRPr sz="1200" kern="1200">
+        <a:solidFill>
+          <a:schemeClr val="tx1"/>
+        </a:solidFill>
+        <a:latin typeface="+mn-lt"/>
+        <a:ea typeface="+mn-ea"/>
+        <a:cs typeface="+mn-cs"/>
+      </a:defRPr>
+    </a:lvl3pPr>
+    <a:lvl4pPr marL="1371600" algn="l" defTabSz="914400" rtl="0" eaLnBrk="1" latinLnBrk="0" hangingPunct="1">
+      <a:defRPr sz="1200" kern="1200">
+        <a:solidFill>
+          <a:schemeClr val="tx1"/>
+        </a:solidFill>
+        <a:latin typeface="+mn-lt"/>
+        <a:ea typeface="+mn-ea"/>
+        <a:cs typeface="+mn-cs"/>
+      </a:defRPr>
+    </a:lvl4pPr>
+    <a:lvl5pPr marL="1828800" algn="l" defTabSz="914400" rtl="0" eaLnBrk="1" latinLnBrk="0" hangingPunct="1">
+      <a:defRPr sz="1200" kern="1200">
+        <a:solidFill>
+          <a:schemeClr val="tx1"/>
+        </a:solidFill>
+        <a:latin typeface="+mn-lt"/>
+        <a:ea typeface="+mn-ea"/>
+        <a:cs typeface="+mn-cs"/>
+      </a:defRPr>
+    </a:lvl5pPr>
+    <a:lvl6pPr marL="2286000" algn="l" defTabSz="914400" rtl="0" eaLnBrk="1" latinLnBrk="0" hangingPunct="1">
+      <a:defRPr sz="1200" kern="1200">
+        <a:solidFill>
+          <a:schemeClr val="tx1"/>
+        </a:solidFill>
+        <a:latin typeface="+mn-lt"/>
+        <a:ea typeface="+mn-ea"/>
+        <a:cs typeface="+mn-cs"/>
+      </a:defRPr>
+    </a:lvl6pPr>
+    <a:lvl7pPr marL="2743200" algn="l" defTabSz="914400" rtl="0" eaLnBrk="1" latinLnBrk="0" hangingPunct="1">
+      <a:defRPr sz="1200" kern="1200">
+        <a:solidFill>
+          <a:schemeClr val="tx1"/>
+        </a:solidFill>
+        <a:latin typeface="+mn-lt"/>
+        <a:ea typeface="+mn-ea"/>
+        <a:cs typeface="+mn-cs"/>
+      </a:defRPr>
+    </a:lvl7pPr>
+    <a:lvl8pPr marL="3200400" algn="l" defTabSz="914400" rtl="0" eaLnBrk="1" latinLnBrk="0" hangingPunct="1">
+      <a:defRPr sz="1200" kern="1200">
+        <a:solidFill>
+          <a:schemeClr val="tx1"/>
+        </a:solidFill>
+        <a:latin typeface="+mn-lt"/>
+        <a:ea typeface="+mn-ea"/>
+        <a:cs typeface="+mn-cs"/>
+      </a:defRPr>
+    </a:lvl8pPr>
+    <a:lvl9pPr marL="3657600" algn="l" defTabSz="914400" rtl="0" eaLnBrk="1" latinLnBrk="0" hangingPunct="1">
+      <a:defRPr sz="1200" kern="1200">
+        <a:solidFill>
+          <a:schemeClr val="tx1"/>
+        </a:solidFill>
+        <a:latin typeface="+mn-lt"/>
+        <a:ea typeface="+mn-ea"/>
+        <a:cs typeface="+mn-cs"/>
+      </a:defRPr>
+    </a:lvl9pPr>
+  </p:notesStyle>
+</p:notesMaster>
+</file>
+
+<file path=ppt/notesSlides/notesSlide1.xml><?xml version="1.0" encoding="utf-8"?>
+<p:notes xmlns:a="http://schemas.openxmlformats.org/drawingml/2006/main" xmlns:r="http://schemas.openxmlformats.org/officeDocument/2006/relationships" xmlns:p="http://schemas.openxmlformats.org/presentationml/2006/main">
+  <p:cSld>
+    <p:spTree>
+      <p:nvGrpSpPr>
+        <p:cNvPr id="1" name=""/>
+        <p:cNvGrpSpPr/>
+        <p:nvPr/>
+      </p:nvGrpSpPr>
+      <p:grpSpPr>
+        <a:xfrm>
+          <a:off x="0" y="0"/>
+          <a:ext cx="0" cy="0"/>
+          <a:chOff x="0" y="0"/>
+          <a:chExt cx="0" cy="0"/>
+        </a:xfrm>
+      </p:grpSpPr>
+      <p:sp>
+        <p:nvSpPr>
+          <p:cNvPr id="2" name="Slide Image Placeholder 1"/>
+          <p:cNvSpPr>
+            <a:spLocks noGrp="1" noRot="1" noChangeAspect="1"/>
+          </p:cNvSpPr>
+          <p:nvPr>
+            <p:ph type="sldImg"/>
+          </p:nvPr>
+        </p:nvSpPr>
+        <p:spPr/>
+      </p:sp>
+      <p:sp>
+        <p:nvSpPr>
+          <p:cNvPr id="3" name="Notes Placeholder 2"/>
+          <p:cNvSpPr>
+            <a:spLocks noGrp="1"/>
+          </p:cNvSpPr>
+          <p:nvPr>
+            <p:ph type="body" idx="1"/>
+          </p:nvPr>
+        </p:nvSpPr>
+        <p:spPr/>
+        <p:txBody>
+          <a:bodyPr/>
+          <a:lstStyle/>
+          <a:p>
+            <a:r>
+              <a:rPr lang="en-US" sz="1200" b="1" kern="1200" dirty="0">
+                <a:solidFill>
+                  <a:schemeClr val="tx1"/>
+                </a:solidFill>
+                <a:effectLst/>
+                <a:latin typeface="+mn-lt"/>
+                <a:ea typeface="+mn-ea"/>
+                <a:cs typeface="+mn-cs"/>
+              </a:rPr>
+              <a:t>Welcome</a:t>
+            </a:r>
+          </a:p>
+          <a:p>
+            <a:endParaRPr lang="en-AU" sz="1200" b="1" kern="1200" dirty="0">
+              <a:solidFill>
+                <a:schemeClr val="tx1"/>
+              </a:solidFill>
+              <a:effectLst/>
+              <a:latin typeface="+mn-lt"/>
+              <a:ea typeface="+mn-ea"/>
+              <a:cs typeface="+mn-cs"/>
+            </a:endParaRPr>
+          </a:p>
+          <a:p>
+            <a:r>
+              <a:rPr lang="en-US" sz="1200" kern="1200" dirty="0">
+                <a:solidFill>
+                  <a:schemeClr val="tx1"/>
+                </a:solidFill>
+                <a:effectLst/>
+                <a:latin typeface="+mn-lt"/>
+                <a:ea typeface="+mn-ea"/>
+                <a:cs typeface="+mn-cs"/>
+              </a:rPr>
+              <a:t>Hi everybody at Transform2020, welcome to our closing talk for our hackathon project!  Our project was about encoding Continuous Wavelet Transforms to estimate lithology boundaries from downhole geophysical logs.  And only using python libraries</a:t>
+            </a:r>
+            <a:endParaRPr lang="en-AU" sz="1200" kern="1200" dirty="0">
+              <a:solidFill>
+                <a:schemeClr val="tx1"/>
+              </a:solidFill>
+              <a:effectLst/>
+              <a:latin typeface="+mn-lt"/>
+              <a:ea typeface="+mn-ea"/>
+              <a:cs typeface="+mn-cs"/>
+            </a:endParaRPr>
+          </a:p>
+          <a:p>
+            <a:endParaRPr lang="en-US" sz="1200" kern="1200" dirty="0">
+              <a:solidFill>
+                <a:schemeClr val="tx1"/>
+              </a:solidFill>
+              <a:effectLst/>
+              <a:latin typeface="+mn-lt"/>
+              <a:ea typeface="+mn-ea"/>
+              <a:cs typeface="+mn-cs"/>
+            </a:endParaRPr>
+          </a:p>
+          <a:p>
+            <a:pPr algn="ctr"/>
+            <a:r>
+              <a:rPr lang="en-US" sz="1200" kern="1200" dirty="0">
+                <a:solidFill>
+                  <a:schemeClr val="tx1"/>
+                </a:solidFill>
+                <a:effectLst/>
+                <a:latin typeface="+mn-lt"/>
+                <a:ea typeface="+mn-ea"/>
+                <a:cs typeface="+mn-cs"/>
+              </a:rPr>
+              <a:t>Move slide (2)</a:t>
+            </a:r>
+            <a:endParaRPr lang="en-AU" sz="1200" kern="1200" dirty="0">
+              <a:solidFill>
+                <a:schemeClr val="tx1"/>
+              </a:solidFill>
+              <a:effectLst/>
+              <a:latin typeface="+mn-lt"/>
+              <a:ea typeface="+mn-ea"/>
+              <a:cs typeface="+mn-cs"/>
+            </a:endParaRPr>
+          </a:p>
+          <a:p>
+            <a:endParaRPr lang="en-AU" dirty="0"/>
+          </a:p>
+        </p:txBody>
+      </p:sp>
+      <p:sp>
+        <p:nvSpPr>
+          <p:cNvPr id="4" name="Slide Number Placeholder 3"/>
+          <p:cNvSpPr>
+            <a:spLocks noGrp="1"/>
+          </p:cNvSpPr>
+          <p:nvPr>
+            <p:ph type="sldNum" sz="quarter" idx="5"/>
+          </p:nvPr>
+        </p:nvSpPr>
+        <p:spPr/>
+        <p:txBody>
+          <a:bodyPr/>
+          <a:lstStyle/>
+          <a:p>
+            <a:fld id="{ECE52E84-FB22-4E35-BFBF-ED86E4A36906}" type="slidenum">
+              <a:rPr lang="en-AU" smtClean="0"/>
+              <a:t>1</a:t>
+            </a:fld>
+            <a:endParaRPr lang="en-AU"/>
+          </a:p>
+        </p:txBody>
+      </p:sp>
+    </p:spTree>
+    <p:extLst>
+      <p:ext uri="{BB962C8B-B14F-4D97-AF65-F5344CB8AC3E}">
+        <p14:creationId xmlns:p14="http://schemas.microsoft.com/office/powerpoint/2010/main" val="2792438351"/>
+      </p:ext>
+    </p:extLst>
+  </p:cSld>
+  <p:clrMapOvr>
+    <a:masterClrMapping/>
+  </p:clrMapOvr>
+</p:notes>
+</file>
+
+<file path=ppt/notesSlides/notesSlide2.xml><?xml version="1.0" encoding="utf-8"?>
+<p:notes xmlns:a="http://schemas.openxmlformats.org/drawingml/2006/main" xmlns:r="http://schemas.openxmlformats.org/officeDocument/2006/relationships" xmlns:p="http://schemas.openxmlformats.org/presentationml/2006/main">
+  <p:cSld>
+    <p:spTree>
+      <p:nvGrpSpPr>
+        <p:cNvPr id="1" name=""/>
+        <p:cNvGrpSpPr/>
+        <p:nvPr/>
+      </p:nvGrpSpPr>
+      <p:grpSpPr>
+        <a:xfrm>
+          <a:off x="0" y="0"/>
+          <a:ext cx="0" cy="0"/>
+          <a:chOff x="0" y="0"/>
+          <a:chExt cx="0" cy="0"/>
+        </a:xfrm>
+      </p:grpSpPr>
+      <p:sp>
+        <p:nvSpPr>
+          <p:cNvPr id="2" name="Slide Image Placeholder 1"/>
+          <p:cNvSpPr>
+            <a:spLocks noGrp="1" noRot="1" noChangeAspect="1"/>
+          </p:cNvSpPr>
+          <p:nvPr>
+            <p:ph type="sldImg"/>
+          </p:nvPr>
+        </p:nvSpPr>
+        <p:spPr/>
+      </p:sp>
+      <p:sp>
+        <p:nvSpPr>
+          <p:cNvPr id="3" name="Notes Placeholder 2"/>
+          <p:cNvSpPr>
+            <a:spLocks noGrp="1"/>
+          </p:cNvSpPr>
+          <p:nvPr>
+            <p:ph type="body" idx="1"/>
+          </p:nvPr>
+        </p:nvSpPr>
+        <p:spPr/>
+        <p:txBody>
+          <a:bodyPr/>
+          <a:lstStyle/>
+          <a:p>
+            <a:r>
+              <a:rPr lang="en-US" sz="1200" kern="1200" dirty="0">
+                <a:solidFill>
+                  <a:schemeClr val="tx1"/>
+                </a:solidFill>
+                <a:effectLst/>
+                <a:latin typeface="+mn-lt"/>
+                <a:ea typeface="+mn-ea"/>
+                <a:cs typeface="+mn-cs"/>
+              </a:rPr>
+              <a:t>My name is Jared Armstrong, and our team includes Leo </a:t>
+            </a:r>
+            <a:r>
+              <a:rPr lang="en-US" sz="1200" kern="1200" dirty="0" err="1">
+                <a:solidFill>
+                  <a:schemeClr val="tx1"/>
+                </a:solidFill>
+                <a:effectLst/>
+                <a:latin typeface="+mn-lt"/>
+                <a:ea typeface="+mn-ea"/>
+                <a:cs typeface="+mn-cs"/>
+              </a:rPr>
+              <a:t>Dinendra</a:t>
+            </a:r>
+            <a:r>
+              <a:rPr lang="en-US" sz="1200" kern="1200" dirty="0">
+                <a:solidFill>
+                  <a:schemeClr val="tx1"/>
+                </a:solidFill>
+                <a:effectLst/>
+                <a:latin typeface="+mn-lt"/>
+                <a:ea typeface="+mn-ea"/>
+                <a:cs typeface="+mn-cs"/>
+              </a:rPr>
+              <a:t>, Martin Bentley and myself!</a:t>
+            </a:r>
+            <a:endParaRPr lang="en-AU" sz="1200" kern="1200" dirty="0">
+              <a:solidFill>
+                <a:schemeClr val="tx1"/>
+              </a:solidFill>
+              <a:effectLst/>
+              <a:latin typeface="+mn-lt"/>
+              <a:ea typeface="+mn-ea"/>
+              <a:cs typeface="+mn-cs"/>
+            </a:endParaRPr>
+          </a:p>
+          <a:p>
+            <a:endParaRPr lang="en-US" sz="1200" kern="1200" dirty="0">
+              <a:solidFill>
+                <a:schemeClr val="tx1"/>
+              </a:solidFill>
+              <a:effectLst/>
+              <a:latin typeface="+mn-lt"/>
+              <a:ea typeface="+mn-ea"/>
+              <a:cs typeface="+mn-cs"/>
+            </a:endParaRPr>
+          </a:p>
+          <a:p>
+            <a:r>
+              <a:rPr lang="en-US" sz="1200" kern="1200" dirty="0">
+                <a:solidFill>
+                  <a:schemeClr val="tx1"/>
+                </a:solidFill>
+                <a:effectLst/>
+                <a:latin typeface="+mn-lt"/>
+                <a:ea typeface="+mn-ea"/>
+                <a:cs typeface="+mn-cs"/>
+              </a:rPr>
+              <a:t>You can read a bit about us here while I am talking.</a:t>
+            </a:r>
+          </a:p>
+          <a:p>
+            <a:endParaRPr lang="en-US" sz="1200" kern="1200" dirty="0">
+              <a:solidFill>
+                <a:schemeClr val="tx1"/>
+              </a:solidFill>
+              <a:effectLst/>
+              <a:latin typeface="+mn-lt"/>
+              <a:ea typeface="+mn-ea"/>
+              <a:cs typeface="+mn-cs"/>
+            </a:endParaRPr>
+          </a:p>
+          <a:p>
+            <a:r>
+              <a:rPr lang="en-AU" sz="1200" b="1" kern="1200" dirty="0">
+                <a:solidFill>
+                  <a:schemeClr val="tx1"/>
+                </a:solidFill>
+                <a:effectLst/>
+                <a:latin typeface="+mn-lt"/>
+                <a:ea typeface="+mn-ea"/>
+                <a:cs typeface="+mn-cs"/>
+              </a:rPr>
+              <a:t>A bit of background to the project .. </a:t>
+            </a:r>
+          </a:p>
+          <a:p>
+            <a:endParaRPr lang="en-AU" sz="1200" b="1" kern="1200" dirty="0">
+              <a:solidFill>
+                <a:schemeClr val="tx1"/>
+              </a:solidFill>
+              <a:effectLst/>
+              <a:latin typeface="+mn-lt"/>
+              <a:ea typeface="+mn-ea"/>
+              <a:cs typeface="+mn-cs"/>
+            </a:endParaRPr>
+          </a:p>
+          <a:p>
+            <a:r>
+              <a:rPr lang="en-AU" sz="1200" kern="1200" dirty="0">
+                <a:solidFill>
+                  <a:schemeClr val="tx1"/>
+                </a:solidFill>
+                <a:effectLst/>
+                <a:latin typeface="+mn-lt"/>
+                <a:ea typeface="+mn-ea"/>
+                <a:cs typeface="+mn-cs"/>
+              </a:rPr>
+              <a:t>A couple of days before this conference I Read Evelyn Jun Hill's paper. I though wow!  Imagine if you could successfully do this in coal sediments by just pressing a button!  </a:t>
+            </a:r>
+          </a:p>
+          <a:p>
+            <a:r>
+              <a:rPr lang="en-AU" sz="1200" kern="1200" dirty="0">
+                <a:solidFill>
+                  <a:schemeClr val="tx1"/>
+                </a:solidFill>
+                <a:effectLst/>
+                <a:latin typeface="+mn-lt"/>
+                <a:ea typeface="+mn-ea"/>
+                <a:cs typeface="+mn-cs"/>
+              </a:rPr>
+              <a:t> </a:t>
+            </a:r>
+          </a:p>
+          <a:p>
+            <a:r>
+              <a:rPr lang="en-AU" sz="1200" kern="1200" dirty="0">
+                <a:solidFill>
+                  <a:schemeClr val="tx1"/>
+                </a:solidFill>
+                <a:effectLst/>
+                <a:latin typeface="+mn-lt"/>
+                <a:ea typeface="+mn-ea"/>
+                <a:cs typeface="+mn-cs"/>
+              </a:rPr>
+              <a:t>You can find a reference to her paper in the slack channel. </a:t>
+            </a:r>
+          </a:p>
+          <a:p>
+            <a:endParaRPr lang="en-AU" sz="1200" kern="1200" dirty="0">
+              <a:solidFill>
+                <a:schemeClr val="tx1"/>
+              </a:solidFill>
+              <a:effectLst/>
+              <a:latin typeface="+mn-lt"/>
+              <a:ea typeface="+mn-ea"/>
+              <a:cs typeface="+mn-cs"/>
+            </a:endParaRPr>
+          </a:p>
+          <a:p>
+            <a:r>
+              <a:rPr lang="en-AU" sz="1200" kern="1200" dirty="0">
+                <a:solidFill>
+                  <a:schemeClr val="tx1"/>
+                </a:solidFill>
+                <a:effectLst/>
+                <a:latin typeface="+mn-lt"/>
+                <a:ea typeface="+mn-ea"/>
+                <a:cs typeface="+mn-cs"/>
+              </a:rPr>
+              <a:t>Anyway during Filippo’s welcoming address for the Hackathon, he encouraged us all to still enter a project if we had an idea, so I decided to have a crack and the project got launched!</a:t>
+            </a:r>
+          </a:p>
+          <a:p>
+            <a:pPr algn="ctr"/>
+            <a:r>
+              <a:rPr lang="en-AU" sz="1200" kern="1200" dirty="0">
+                <a:solidFill>
+                  <a:schemeClr val="tx1"/>
+                </a:solidFill>
+                <a:effectLst/>
+                <a:latin typeface="+mn-lt"/>
+                <a:ea typeface="+mn-ea"/>
+                <a:cs typeface="+mn-cs"/>
+              </a:rPr>
+              <a:t>Move to third slide (synth log)</a:t>
+            </a:r>
+          </a:p>
+          <a:p>
+            <a:endParaRPr lang="en-AU" dirty="0"/>
+          </a:p>
+        </p:txBody>
+      </p:sp>
+      <p:sp>
+        <p:nvSpPr>
+          <p:cNvPr id="4" name="Slide Number Placeholder 3"/>
+          <p:cNvSpPr>
+            <a:spLocks noGrp="1"/>
+          </p:cNvSpPr>
+          <p:nvPr>
+            <p:ph type="sldNum" sz="quarter" idx="5"/>
+          </p:nvPr>
+        </p:nvSpPr>
+        <p:spPr/>
+        <p:txBody>
+          <a:bodyPr/>
+          <a:lstStyle/>
+          <a:p>
+            <a:fld id="{ECE52E84-FB22-4E35-BFBF-ED86E4A36906}" type="slidenum">
+              <a:rPr lang="en-AU" smtClean="0"/>
+              <a:t>2</a:t>
+            </a:fld>
+            <a:endParaRPr lang="en-AU"/>
+          </a:p>
+        </p:txBody>
+      </p:sp>
+    </p:spTree>
+    <p:extLst>
+      <p:ext uri="{BB962C8B-B14F-4D97-AF65-F5344CB8AC3E}">
+        <p14:creationId xmlns:p14="http://schemas.microsoft.com/office/powerpoint/2010/main" val="3894864108"/>
+      </p:ext>
+    </p:extLst>
+  </p:cSld>
+  <p:clrMapOvr>
+    <a:masterClrMapping/>
+  </p:clrMapOvr>
+</p:notes>
+</file>
+
+<file path=ppt/notesSlides/notesSlide3.xml><?xml version="1.0" encoding="utf-8"?>
+<p:notes xmlns:a="http://schemas.openxmlformats.org/drawingml/2006/main" xmlns:r="http://schemas.openxmlformats.org/officeDocument/2006/relationships" xmlns:p="http://schemas.openxmlformats.org/presentationml/2006/main">
+  <p:cSld>
+    <p:spTree>
+      <p:nvGrpSpPr>
+        <p:cNvPr id="1" name=""/>
+        <p:cNvGrpSpPr/>
+        <p:nvPr/>
+      </p:nvGrpSpPr>
+      <p:grpSpPr>
+        <a:xfrm>
+          <a:off x="0" y="0"/>
+          <a:ext cx="0" cy="0"/>
+          <a:chOff x="0" y="0"/>
+          <a:chExt cx="0" cy="0"/>
+        </a:xfrm>
+      </p:grpSpPr>
+      <p:sp>
+        <p:nvSpPr>
+          <p:cNvPr id="2" name="Slide Image Placeholder 1"/>
+          <p:cNvSpPr>
+            <a:spLocks noGrp="1" noRot="1" noChangeAspect="1"/>
+          </p:cNvSpPr>
+          <p:nvPr>
+            <p:ph type="sldImg"/>
+          </p:nvPr>
+        </p:nvSpPr>
+        <p:spPr/>
+      </p:sp>
+      <p:sp>
+        <p:nvSpPr>
+          <p:cNvPr id="3" name="Notes Placeholder 2"/>
+          <p:cNvSpPr>
+            <a:spLocks noGrp="1"/>
+          </p:cNvSpPr>
+          <p:nvPr>
+            <p:ph type="body" idx="1"/>
+          </p:nvPr>
+        </p:nvSpPr>
+        <p:spPr/>
+        <p:txBody>
+          <a:bodyPr/>
+          <a:lstStyle/>
+          <a:p>
+            <a:r>
+              <a:rPr lang="en-US" sz="1200" kern="1200" dirty="0">
+                <a:solidFill>
+                  <a:schemeClr val="tx1"/>
+                </a:solidFill>
+                <a:effectLst/>
+                <a:latin typeface="+mn-lt"/>
+                <a:ea typeface="+mn-ea"/>
+                <a:cs typeface="+mn-cs"/>
+              </a:rPr>
+              <a:t>This is the gamma log.  The first 2 plots are the full hole.  The last two plots are the bottom 150m.  You can see the difference between the raw and conditioned logs</a:t>
+            </a:r>
+          </a:p>
+          <a:p>
+            <a:endParaRPr lang="en-US" sz="1200" kern="1200" dirty="0">
+              <a:solidFill>
+                <a:schemeClr val="tx1"/>
+              </a:solidFill>
+              <a:effectLst/>
+              <a:latin typeface="+mn-lt"/>
+              <a:ea typeface="+mn-ea"/>
+              <a:cs typeface="+mn-cs"/>
+            </a:endParaRPr>
+          </a:p>
+          <a:p>
+            <a:pPr marL="0" marR="0" lvl="0" indent="0" algn="l" defTabSz="914400" rtl="0" eaLnBrk="1" fontAlgn="auto" latinLnBrk="0" hangingPunct="1">
+              <a:lnSpc>
+                <a:spcPct val="100000"/>
+              </a:lnSpc>
+              <a:spcBef>
+                <a:spcPts val="0"/>
+              </a:spcBef>
+              <a:spcAft>
+                <a:spcPts val="0"/>
+              </a:spcAft>
+              <a:buClrTx/>
+              <a:buSzTx/>
+              <a:buFontTx/>
+              <a:buNone/>
+              <a:tabLst/>
+              <a:defRPr/>
+            </a:pPr>
+            <a:r>
+              <a:rPr lang="en-US" sz="1200" b="1" kern="1200" dirty="0">
+                <a:solidFill>
+                  <a:schemeClr val="tx1"/>
+                </a:solidFill>
+                <a:effectLst/>
+                <a:latin typeface="+mn-lt"/>
+                <a:ea typeface="+mn-ea"/>
+                <a:cs typeface="+mn-cs"/>
+              </a:rPr>
+              <a:t>I want to talk a bit about the process</a:t>
+            </a:r>
+            <a:endParaRPr lang="en-AU" sz="1200" b="1" kern="1200" dirty="0">
+              <a:solidFill>
+                <a:schemeClr val="tx1"/>
+              </a:solidFill>
+              <a:effectLst/>
+              <a:latin typeface="+mn-lt"/>
+              <a:ea typeface="+mn-ea"/>
+              <a:cs typeface="+mn-cs"/>
+            </a:endParaRPr>
+          </a:p>
+          <a:p>
+            <a:endParaRPr lang="en-US" sz="1200" kern="1200" dirty="0">
+              <a:solidFill>
+                <a:schemeClr val="tx1"/>
+              </a:solidFill>
+              <a:effectLst/>
+              <a:latin typeface="+mn-lt"/>
+              <a:ea typeface="+mn-ea"/>
+              <a:cs typeface="+mn-cs"/>
+            </a:endParaRPr>
+          </a:p>
+          <a:p>
+            <a:r>
+              <a:rPr lang="en-US" sz="1200" u="sng" kern="1200" dirty="0">
+                <a:solidFill>
+                  <a:schemeClr val="tx1"/>
+                </a:solidFill>
+                <a:effectLst/>
+                <a:latin typeface="+mn-lt"/>
+                <a:ea typeface="+mn-ea"/>
+                <a:cs typeface="+mn-cs"/>
+              </a:rPr>
+              <a:t>Firstly</a:t>
+            </a:r>
+            <a:r>
+              <a:rPr lang="en-US" sz="1200" kern="1200" dirty="0">
+                <a:solidFill>
+                  <a:schemeClr val="tx1"/>
+                </a:solidFill>
+                <a:effectLst/>
+                <a:latin typeface="+mn-lt"/>
+                <a:ea typeface="+mn-ea"/>
+                <a:cs typeface="+mn-cs"/>
+              </a:rPr>
+              <a:t>, we realized the raw log was visually too busy. After playing around a bit, we log conditioned using the </a:t>
+            </a:r>
+            <a:r>
+              <a:rPr lang="en-US" sz="1200" kern="1200" dirty="0" err="1">
+                <a:solidFill>
+                  <a:schemeClr val="tx1"/>
+                </a:solidFill>
+                <a:effectLst/>
+                <a:latin typeface="+mn-lt"/>
+                <a:ea typeface="+mn-ea"/>
+                <a:cs typeface="+mn-cs"/>
+              </a:rPr>
+              <a:t>savgol</a:t>
+            </a:r>
+            <a:r>
+              <a:rPr lang="en-US" sz="1200" kern="1200" dirty="0">
+                <a:solidFill>
+                  <a:schemeClr val="tx1"/>
+                </a:solidFill>
+                <a:effectLst/>
+                <a:latin typeface="+mn-lt"/>
+                <a:ea typeface="+mn-ea"/>
+                <a:cs typeface="+mn-cs"/>
+              </a:rPr>
+              <a:t> filter. then Later we switched from gamma to density log.  </a:t>
+            </a:r>
+            <a:endParaRPr lang="en-AU" sz="1200" kern="1200" dirty="0">
+              <a:solidFill>
+                <a:schemeClr val="tx1"/>
+              </a:solidFill>
+              <a:effectLst/>
+              <a:latin typeface="+mn-lt"/>
+              <a:ea typeface="+mn-ea"/>
+              <a:cs typeface="+mn-cs"/>
+            </a:endParaRPr>
+          </a:p>
+          <a:p>
+            <a:endParaRPr lang="en-US" sz="1200" kern="1200" dirty="0">
+              <a:solidFill>
+                <a:schemeClr val="tx1"/>
+              </a:solidFill>
+              <a:effectLst/>
+              <a:latin typeface="+mn-lt"/>
+              <a:ea typeface="+mn-ea"/>
+              <a:cs typeface="+mn-cs"/>
+            </a:endParaRPr>
+          </a:p>
+          <a:p>
+            <a:r>
+              <a:rPr lang="en-US" sz="1200" kern="1200" dirty="0">
+                <a:solidFill>
+                  <a:schemeClr val="tx1"/>
+                </a:solidFill>
+                <a:effectLst/>
+                <a:latin typeface="+mn-lt"/>
+                <a:ea typeface="+mn-ea"/>
+                <a:cs typeface="+mn-cs"/>
+              </a:rPr>
+              <a:t>Some of the libraries we ended up using are on the screen ..</a:t>
+            </a:r>
+          </a:p>
+          <a:p>
+            <a:endParaRPr lang="en-AU" sz="1200" kern="1200" dirty="0">
+              <a:solidFill>
+                <a:schemeClr val="tx1"/>
+              </a:solidFill>
+              <a:effectLst/>
+              <a:latin typeface="+mn-lt"/>
+              <a:ea typeface="+mn-ea"/>
+              <a:cs typeface="+mn-cs"/>
+            </a:endParaRPr>
+          </a:p>
+          <a:p>
+            <a:pPr lvl="1"/>
+            <a:r>
+              <a:rPr lang="en-US" sz="1200" kern="1200" dirty="0">
+                <a:solidFill>
+                  <a:schemeClr val="tx1"/>
+                </a:solidFill>
+                <a:effectLst/>
+                <a:latin typeface="+mn-lt"/>
+                <a:ea typeface="+mn-ea"/>
+                <a:cs typeface="+mn-cs"/>
+              </a:rPr>
+              <a:t>Numpy</a:t>
+            </a:r>
+            <a:endParaRPr lang="en-AU" sz="1200" kern="1200" dirty="0">
+              <a:solidFill>
+                <a:schemeClr val="tx1"/>
+              </a:solidFill>
+              <a:effectLst/>
+              <a:latin typeface="+mn-lt"/>
+              <a:ea typeface="+mn-ea"/>
+              <a:cs typeface="+mn-cs"/>
+            </a:endParaRPr>
+          </a:p>
+          <a:p>
+            <a:pPr lvl="1"/>
+            <a:r>
+              <a:rPr lang="en-US" sz="1200" kern="1200" dirty="0">
+                <a:solidFill>
+                  <a:schemeClr val="tx1"/>
+                </a:solidFill>
+                <a:effectLst/>
+                <a:latin typeface="+mn-lt"/>
+                <a:ea typeface="+mn-ea"/>
+                <a:cs typeface="+mn-cs"/>
+              </a:rPr>
+              <a:t>Pandas</a:t>
+            </a:r>
+            <a:endParaRPr lang="en-AU" sz="1200" kern="1200" dirty="0">
+              <a:solidFill>
+                <a:schemeClr val="tx1"/>
+              </a:solidFill>
+              <a:effectLst/>
+              <a:latin typeface="+mn-lt"/>
+              <a:ea typeface="+mn-ea"/>
+              <a:cs typeface="+mn-cs"/>
+            </a:endParaRPr>
+          </a:p>
+          <a:p>
+            <a:pPr lvl="1"/>
+            <a:r>
+              <a:rPr lang="en-US" sz="1200" kern="1200" dirty="0">
+                <a:solidFill>
+                  <a:schemeClr val="tx1"/>
+                </a:solidFill>
+                <a:effectLst/>
+                <a:latin typeface="+mn-lt"/>
+                <a:ea typeface="+mn-ea"/>
+                <a:cs typeface="+mn-cs"/>
+              </a:rPr>
+              <a:t>Matplotlib</a:t>
+            </a:r>
+            <a:endParaRPr lang="en-AU" sz="1200" kern="1200" dirty="0">
+              <a:solidFill>
+                <a:schemeClr val="tx1"/>
+              </a:solidFill>
+              <a:effectLst/>
+              <a:latin typeface="+mn-lt"/>
+              <a:ea typeface="+mn-ea"/>
+              <a:cs typeface="+mn-cs"/>
+            </a:endParaRPr>
+          </a:p>
+          <a:p>
+            <a:pPr lvl="1"/>
+            <a:r>
+              <a:rPr lang="en-US" sz="1200" kern="1200" dirty="0" err="1">
+                <a:solidFill>
+                  <a:schemeClr val="tx1"/>
+                </a:solidFill>
+                <a:effectLst/>
+                <a:latin typeface="+mn-lt"/>
+                <a:ea typeface="+mn-ea"/>
+                <a:cs typeface="+mn-cs"/>
+              </a:rPr>
+              <a:t>Scipy</a:t>
+            </a:r>
+            <a:endParaRPr lang="en-AU" sz="1200" kern="1200" dirty="0">
+              <a:solidFill>
+                <a:schemeClr val="tx1"/>
+              </a:solidFill>
+              <a:effectLst/>
+              <a:latin typeface="+mn-lt"/>
+              <a:ea typeface="+mn-ea"/>
+              <a:cs typeface="+mn-cs"/>
+            </a:endParaRPr>
+          </a:p>
+          <a:p>
+            <a:pPr lvl="1"/>
+            <a:r>
+              <a:rPr lang="en-US" sz="1200" kern="1200" dirty="0" err="1">
+                <a:solidFill>
+                  <a:schemeClr val="tx1"/>
+                </a:solidFill>
+                <a:effectLst/>
+                <a:latin typeface="+mn-lt"/>
+                <a:ea typeface="+mn-ea"/>
+                <a:cs typeface="+mn-cs"/>
+              </a:rPr>
+              <a:t>Pywt</a:t>
+            </a:r>
+            <a:r>
+              <a:rPr lang="en-US" sz="1200" kern="1200" dirty="0">
+                <a:solidFill>
+                  <a:schemeClr val="tx1"/>
+                </a:solidFill>
+                <a:effectLst/>
+                <a:latin typeface="+mn-lt"/>
+                <a:ea typeface="+mn-ea"/>
+                <a:cs typeface="+mn-cs"/>
+              </a:rPr>
+              <a:t> (for the CWT)</a:t>
+            </a:r>
+            <a:endParaRPr lang="en-AU" sz="1200" kern="1200" dirty="0">
+              <a:solidFill>
+                <a:schemeClr val="tx1"/>
+              </a:solidFill>
+              <a:effectLst/>
+              <a:latin typeface="+mn-lt"/>
+              <a:ea typeface="+mn-ea"/>
+              <a:cs typeface="+mn-cs"/>
+            </a:endParaRPr>
+          </a:p>
+          <a:p>
+            <a:pPr marL="0" marR="0" lvl="0" indent="0" algn="ctr" defTabSz="914400" rtl="0" eaLnBrk="1" fontAlgn="auto" latinLnBrk="0" hangingPunct="1">
+              <a:lnSpc>
+                <a:spcPct val="100000"/>
+              </a:lnSpc>
+              <a:spcBef>
+                <a:spcPts val="0"/>
+              </a:spcBef>
+              <a:spcAft>
+                <a:spcPts val="0"/>
+              </a:spcAft>
+              <a:buClrTx/>
+              <a:buSzTx/>
+              <a:buFontTx/>
+              <a:buNone/>
+              <a:tabLst/>
+              <a:defRPr/>
+            </a:pPr>
+            <a:r>
+              <a:rPr lang="en-US" sz="1200" kern="1200" dirty="0">
+                <a:solidFill>
+                  <a:schemeClr val="tx1"/>
+                </a:solidFill>
+                <a:effectLst/>
+                <a:latin typeface="+mn-lt"/>
+                <a:ea typeface="+mn-ea"/>
+                <a:cs typeface="+mn-cs"/>
+              </a:rPr>
+              <a:t>Move to next slide (5)</a:t>
+            </a:r>
+            <a:endParaRPr lang="en-AU" sz="1200" kern="1200" dirty="0">
+              <a:solidFill>
+                <a:schemeClr val="tx1"/>
+              </a:solidFill>
+              <a:effectLst/>
+              <a:latin typeface="+mn-lt"/>
+              <a:ea typeface="+mn-ea"/>
+              <a:cs typeface="+mn-cs"/>
+            </a:endParaRPr>
+          </a:p>
+          <a:p>
+            <a:endParaRPr lang="en-AU" dirty="0"/>
+          </a:p>
+          <a:p>
+            <a:endParaRPr lang="en-AU" dirty="0"/>
+          </a:p>
+        </p:txBody>
+      </p:sp>
+      <p:sp>
+        <p:nvSpPr>
+          <p:cNvPr id="4" name="Slide Number Placeholder 3"/>
+          <p:cNvSpPr>
+            <a:spLocks noGrp="1"/>
+          </p:cNvSpPr>
+          <p:nvPr>
+            <p:ph type="sldNum" sz="quarter" idx="5"/>
+          </p:nvPr>
+        </p:nvSpPr>
+        <p:spPr/>
+        <p:txBody>
+          <a:bodyPr/>
+          <a:lstStyle/>
+          <a:p>
+            <a:fld id="{ECE52E84-FB22-4E35-BFBF-ED86E4A36906}" type="slidenum">
+              <a:rPr lang="en-AU" smtClean="0"/>
+              <a:t>3</a:t>
+            </a:fld>
+            <a:endParaRPr lang="en-AU"/>
+          </a:p>
+        </p:txBody>
+      </p:sp>
+    </p:spTree>
+    <p:extLst>
+      <p:ext uri="{BB962C8B-B14F-4D97-AF65-F5344CB8AC3E}">
+        <p14:creationId xmlns:p14="http://schemas.microsoft.com/office/powerpoint/2010/main" val="1926550837"/>
+      </p:ext>
+    </p:extLst>
+  </p:cSld>
+  <p:clrMapOvr>
+    <a:masterClrMapping/>
+  </p:clrMapOvr>
+</p:notes>
+</file>
+
+<file path=ppt/notesSlides/notesSlide4.xml><?xml version="1.0" encoding="utf-8"?>
+<p:notes xmlns:a="http://schemas.openxmlformats.org/drawingml/2006/main" xmlns:r="http://schemas.openxmlformats.org/officeDocument/2006/relationships" xmlns:p="http://schemas.openxmlformats.org/presentationml/2006/main">
+  <p:cSld>
+    <p:spTree>
+      <p:nvGrpSpPr>
+        <p:cNvPr id="1" name=""/>
+        <p:cNvGrpSpPr/>
+        <p:nvPr/>
+      </p:nvGrpSpPr>
+      <p:grpSpPr>
+        <a:xfrm>
+          <a:off x="0" y="0"/>
+          <a:ext cx="0" cy="0"/>
+          <a:chOff x="0" y="0"/>
+          <a:chExt cx="0" cy="0"/>
+        </a:xfrm>
+      </p:grpSpPr>
+      <p:sp>
+        <p:nvSpPr>
+          <p:cNvPr id="2" name="Slide Image Placeholder 1"/>
+          <p:cNvSpPr>
+            <a:spLocks noGrp="1" noRot="1" noChangeAspect="1"/>
+          </p:cNvSpPr>
+          <p:nvPr>
+            <p:ph type="sldImg"/>
+          </p:nvPr>
+        </p:nvSpPr>
+        <p:spPr/>
+      </p:sp>
+      <p:sp>
+        <p:nvSpPr>
+          <p:cNvPr id="3" name="Notes Placeholder 2"/>
+          <p:cNvSpPr>
+            <a:spLocks noGrp="1"/>
+          </p:cNvSpPr>
+          <p:nvPr>
+            <p:ph type="body" idx="1"/>
+          </p:nvPr>
+        </p:nvSpPr>
+        <p:spPr/>
+        <p:txBody>
+          <a:bodyPr/>
+          <a:lstStyle/>
+          <a:p>
+            <a:r>
+              <a:rPr lang="en-US" sz="1200" u="sng" kern="1200" dirty="0">
+                <a:solidFill>
+                  <a:schemeClr val="tx1"/>
+                </a:solidFill>
+                <a:effectLst/>
+                <a:latin typeface="+mn-lt"/>
+                <a:ea typeface="+mn-ea"/>
+                <a:cs typeface="+mn-cs"/>
+              </a:rPr>
+              <a:t>Secondly</a:t>
+            </a:r>
+            <a:r>
+              <a:rPr lang="en-US" sz="1200" kern="1200" dirty="0">
+                <a:solidFill>
+                  <a:schemeClr val="tx1"/>
+                </a:solidFill>
+                <a:effectLst/>
+                <a:latin typeface="+mn-lt"/>
+                <a:ea typeface="+mn-ea"/>
+                <a:cs typeface="+mn-cs"/>
+              </a:rPr>
+              <a:t>, We (or Leo) successfully generating the CWT  on the left and the boundary strength plot ..</a:t>
+            </a:r>
+          </a:p>
+          <a:p>
+            <a:endParaRPr lang="en-US" sz="1200" kern="1200" dirty="0">
+              <a:solidFill>
+                <a:schemeClr val="tx1"/>
+              </a:solidFill>
+              <a:effectLst/>
+              <a:latin typeface="+mn-lt"/>
+              <a:ea typeface="+mn-ea"/>
+              <a:cs typeface="+mn-cs"/>
+            </a:endParaRPr>
+          </a:p>
+          <a:p>
+            <a:pPr marL="0" marR="0" lvl="0" indent="0" algn="l" defTabSz="914400" rtl="0" eaLnBrk="1" fontAlgn="auto" latinLnBrk="0" hangingPunct="1">
+              <a:lnSpc>
+                <a:spcPct val="100000"/>
+              </a:lnSpc>
+              <a:spcBef>
+                <a:spcPts val="0"/>
+              </a:spcBef>
+              <a:spcAft>
+                <a:spcPts val="0"/>
+              </a:spcAft>
+              <a:buClrTx/>
+              <a:buSzTx/>
+              <a:buFontTx/>
+              <a:buNone/>
+              <a:tabLst/>
+              <a:defRPr/>
+            </a:pPr>
+            <a:r>
+              <a:rPr lang="en-US" sz="1200" kern="1200" dirty="0">
+                <a:solidFill>
+                  <a:schemeClr val="tx1"/>
+                </a:solidFill>
+                <a:effectLst/>
+                <a:latin typeface="+mn-lt"/>
+                <a:ea typeface="+mn-ea"/>
+                <a:cs typeface="+mn-cs"/>
+              </a:rPr>
+              <a:t>this is the only bit of code you will see so savor it while you can! </a:t>
+            </a:r>
+          </a:p>
+          <a:p>
+            <a:pPr marL="0" marR="0" lvl="0" indent="0" algn="ctr" defTabSz="914400" rtl="0" eaLnBrk="1" fontAlgn="auto" latinLnBrk="0" hangingPunct="1">
+              <a:lnSpc>
+                <a:spcPct val="100000"/>
+              </a:lnSpc>
+              <a:spcBef>
+                <a:spcPts val="0"/>
+              </a:spcBef>
+              <a:spcAft>
+                <a:spcPts val="0"/>
+              </a:spcAft>
+              <a:buClrTx/>
+              <a:buSzTx/>
+              <a:buFontTx/>
+              <a:buNone/>
+              <a:tabLst/>
+              <a:defRPr/>
+            </a:pPr>
+            <a:r>
+              <a:rPr lang="en-US" sz="1200" kern="1200" dirty="0">
+                <a:solidFill>
+                  <a:schemeClr val="tx1"/>
+                </a:solidFill>
+                <a:effectLst/>
+                <a:latin typeface="+mn-lt"/>
+                <a:ea typeface="+mn-ea"/>
+                <a:cs typeface="+mn-cs"/>
+              </a:rPr>
+              <a:t>Move to next slide (6)</a:t>
+            </a:r>
+            <a:endParaRPr lang="en-AU" sz="1200" kern="1200" dirty="0">
+              <a:solidFill>
+                <a:schemeClr val="tx1"/>
+              </a:solidFill>
+              <a:effectLst/>
+              <a:latin typeface="+mn-lt"/>
+              <a:ea typeface="+mn-ea"/>
+              <a:cs typeface="+mn-cs"/>
+            </a:endParaRPr>
+          </a:p>
+          <a:p>
+            <a:endParaRPr lang="en-AU" dirty="0"/>
+          </a:p>
+        </p:txBody>
+      </p:sp>
+      <p:sp>
+        <p:nvSpPr>
+          <p:cNvPr id="4" name="Slide Number Placeholder 3"/>
+          <p:cNvSpPr>
+            <a:spLocks noGrp="1"/>
+          </p:cNvSpPr>
+          <p:nvPr>
+            <p:ph type="sldNum" sz="quarter" idx="5"/>
+          </p:nvPr>
+        </p:nvSpPr>
+        <p:spPr/>
+        <p:txBody>
+          <a:bodyPr/>
+          <a:lstStyle/>
+          <a:p>
+            <a:fld id="{ECE52E84-FB22-4E35-BFBF-ED86E4A36906}" type="slidenum">
+              <a:rPr lang="en-AU" smtClean="0"/>
+              <a:t>4</a:t>
+            </a:fld>
+            <a:endParaRPr lang="en-AU"/>
+          </a:p>
+        </p:txBody>
+      </p:sp>
+    </p:spTree>
+    <p:extLst>
+      <p:ext uri="{BB962C8B-B14F-4D97-AF65-F5344CB8AC3E}">
+        <p14:creationId xmlns:p14="http://schemas.microsoft.com/office/powerpoint/2010/main" val="2139841585"/>
+      </p:ext>
+    </p:extLst>
+  </p:cSld>
+  <p:clrMapOvr>
+    <a:masterClrMapping/>
+  </p:clrMapOvr>
+</p:notes>
+</file>
+
+<file path=ppt/notesSlides/notesSlide5.xml><?xml version="1.0" encoding="utf-8"?>
+<p:notes xmlns:a="http://schemas.openxmlformats.org/drawingml/2006/main" xmlns:r="http://schemas.openxmlformats.org/officeDocument/2006/relationships" xmlns:p="http://schemas.openxmlformats.org/presentationml/2006/main">
+  <p:cSld>
+    <p:spTree>
+      <p:nvGrpSpPr>
+        <p:cNvPr id="1" name=""/>
+        <p:cNvGrpSpPr/>
+        <p:nvPr/>
+      </p:nvGrpSpPr>
+      <p:grpSpPr>
+        <a:xfrm>
+          <a:off x="0" y="0"/>
+          <a:ext cx="0" cy="0"/>
+          <a:chOff x="0" y="0"/>
+          <a:chExt cx="0" cy="0"/>
+        </a:xfrm>
+      </p:grpSpPr>
+      <p:sp>
+        <p:nvSpPr>
+          <p:cNvPr id="2" name="Slide Image Placeholder 1"/>
+          <p:cNvSpPr>
+            <a:spLocks noGrp="1" noRot="1" noChangeAspect="1"/>
+          </p:cNvSpPr>
+          <p:nvPr>
+            <p:ph type="sldImg"/>
+          </p:nvPr>
+        </p:nvSpPr>
+        <p:spPr/>
+      </p:sp>
+      <p:sp>
+        <p:nvSpPr>
+          <p:cNvPr id="3" name="Notes Placeholder 2"/>
+          <p:cNvSpPr>
+            <a:spLocks noGrp="1"/>
+          </p:cNvSpPr>
+          <p:nvPr>
+            <p:ph type="body" idx="1"/>
+          </p:nvPr>
+        </p:nvSpPr>
+        <p:spPr/>
+        <p:txBody>
+          <a:bodyPr/>
+          <a:lstStyle/>
+          <a:p>
+            <a:pPr marL="0" marR="0" lvl="0" indent="0" algn="l" defTabSz="914400" rtl="0" eaLnBrk="1" fontAlgn="auto" latinLnBrk="0" hangingPunct="1">
+              <a:lnSpc>
+                <a:spcPct val="100000"/>
+              </a:lnSpc>
+              <a:spcBef>
+                <a:spcPts val="0"/>
+              </a:spcBef>
+              <a:spcAft>
+                <a:spcPts val="0"/>
+              </a:spcAft>
+              <a:buClrTx/>
+              <a:buSzTx/>
+              <a:buFontTx/>
+              <a:buNone/>
+              <a:tabLst/>
+              <a:defRPr/>
+            </a:pPr>
+            <a:r>
+              <a:rPr lang="en-US" sz="1200" u="sng" kern="1200" dirty="0">
+                <a:solidFill>
+                  <a:schemeClr val="tx1"/>
+                </a:solidFill>
+                <a:effectLst/>
+                <a:latin typeface="+mn-lt"/>
+                <a:ea typeface="+mn-ea"/>
+                <a:cs typeface="+mn-cs"/>
+              </a:rPr>
+              <a:t>Finally!  </a:t>
+            </a:r>
+            <a:r>
+              <a:rPr lang="en-US" sz="1200" kern="1200" dirty="0">
+                <a:solidFill>
+                  <a:schemeClr val="tx1"/>
+                </a:solidFill>
+                <a:effectLst/>
+                <a:latin typeface="+mn-lt"/>
+                <a:ea typeface="+mn-ea"/>
+                <a:cs typeface="+mn-cs"/>
+              </a:rPr>
+              <a:t>the mosaic plot!.   Yay!  You can clap right about now!!</a:t>
+            </a:r>
+          </a:p>
+          <a:p>
+            <a:pPr marL="0" marR="0" lvl="0" indent="0" algn="ctr" defTabSz="914400" rtl="0" eaLnBrk="1" fontAlgn="auto" latinLnBrk="0" hangingPunct="1">
+              <a:lnSpc>
+                <a:spcPct val="100000"/>
+              </a:lnSpc>
+              <a:spcBef>
+                <a:spcPts val="0"/>
+              </a:spcBef>
+              <a:spcAft>
+                <a:spcPts val="0"/>
+              </a:spcAft>
+              <a:buClrTx/>
+              <a:buSzTx/>
+              <a:buFontTx/>
+              <a:buNone/>
+              <a:tabLst/>
+              <a:defRPr/>
+            </a:pPr>
+            <a:r>
+              <a:rPr lang="en-US" sz="1200" kern="1200" dirty="0">
+                <a:solidFill>
+                  <a:schemeClr val="tx1"/>
+                </a:solidFill>
+                <a:effectLst/>
+                <a:latin typeface="+mn-lt"/>
+                <a:ea typeface="+mn-ea"/>
+                <a:cs typeface="+mn-cs"/>
+              </a:rPr>
+              <a:t>Click to add black arrows showing coal seams</a:t>
+            </a:r>
+          </a:p>
+          <a:p>
+            <a:pPr marL="0" marR="0" lvl="0" indent="0" algn="l" defTabSz="914400" rtl="0" eaLnBrk="1" fontAlgn="auto" latinLnBrk="0" hangingPunct="1">
+              <a:lnSpc>
+                <a:spcPct val="100000"/>
+              </a:lnSpc>
+              <a:spcBef>
+                <a:spcPts val="0"/>
+              </a:spcBef>
+              <a:spcAft>
+                <a:spcPts val="0"/>
+              </a:spcAft>
+              <a:buClrTx/>
+              <a:buSzTx/>
+              <a:buFontTx/>
+              <a:buNone/>
+              <a:tabLst/>
+              <a:defRPr/>
+            </a:pPr>
+            <a:endParaRPr lang="en-US" sz="1200" kern="1200" dirty="0">
+              <a:solidFill>
+                <a:schemeClr val="tx1"/>
+              </a:solidFill>
+              <a:effectLst/>
+              <a:latin typeface="+mn-lt"/>
+              <a:ea typeface="+mn-ea"/>
+              <a:cs typeface="+mn-cs"/>
+            </a:endParaRPr>
+          </a:p>
+          <a:p>
+            <a:pPr marL="0" marR="0" lvl="0" indent="0" algn="l" defTabSz="914400" rtl="0" eaLnBrk="1" fontAlgn="auto" latinLnBrk="0" hangingPunct="1">
+              <a:lnSpc>
+                <a:spcPct val="100000"/>
+              </a:lnSpc>
+              <a:spcBef>
+                <a:spcPts val="0"/>
+              </a:spcBef>
+              <a:spcAft>
+                <a:spcPts val="0"/>
+              </a:spcAft>
+              <a:buClrTx/>
+              <a:buSzTx/>
+              <a:buFontTx/>
+              <a:buNone/>
+              <a:tabLst/>
+              <a:defRPr/>
+            </a:pPr>
+            <a:r>
+              <a:rPr lang="en-US" sz="1200" kern="1200" dirty="0">
+                <a:solidFill>
+                  <a:schemeClr val="tx1"/>
+                </a:solidFill>
+                <a:effectLst/>
+                <a:latin typeface="+mn-lt"/>
+                <a:ea typeface="+mn-ea"/>
+                <a:cs typeface="+mn-cs"/>
+              </a:rPr>
+              <a:t>First is gamma, second is density ( or RHOB). Black arrows point to the coal seams.</a:t>
+            </a:r>
+          </a:p>
+          <a:p>
+            <a:pPr marL="0" marR="0" lvl="0" indent="0" algn="l" defTabSz="914400" rtl="0" eaLnBrk="1" fontAlgn="auto" latinLnBrk="0" hangingPunct="1">
+              <a:lnSpc>
+                <a:spcPct val="100000"/>
+              </a:lnSpc>
+              <a:spcBef>
+                <a:spcPts val="0"/>
+              </a:spcBef>
+              <a:spcAft>
+                <a:spcPts val="0"/>
+              </a:spcAft>
+              <a:buClrTx/>
+              <a:buSzTx/>
+              <a:buFontTx/>
+              <a:buNone/>
+              <a:tabLst/>
+              <a:defRPr/>
+            </a:pPr>
+            <a:endParaRPr lang="en-US" sz="1200" kern="1200" dirty="0">
+              <a:solidFill>
+                <a:schemeClr val="tx1"/>
+              </a:solidFill>
+              <a:effectLst/>
+              <a:latin typeface="+mn-lt"/>
+              <a:ea typeface="+mn-ea"/>
+              <a:cs typeface="+mn-cs"/>
+            </a:endParaRPr>
+          </a:p>
+          <a:p>
+            <a:r>
+              <a:rPr lang="en-US" sz="1200" kern="1200" dirty="0">
+                <a:solidFill>
+                  <a:schemeClr val="tx1"/>
+                </a:solidFill>
+                <a:effectLst/>
+                <a:latin typeface="+mn-lt"/>
+                <a:ea typeface="+mn-ea"/>
+                <a:cs typeface="+mn-cs"/>
+              </a:rPr>
+              <a:t>Unfortunately we found the visual correlation between the gamma and lithological boundaries to be fairly average, </a:t>
+            </a:r>
+          </a:p>
+          <a:p>
+            <a:endParaRPr lang="en-AU" sz="1200" kern="1200" dirty="0">
+              <a:solidFill>
+                <a:schemeClr val="tx1"/>
+              </a:solidFill>
+              <a:effectLst/>
+              <a:latin typeface="+mn-lt"/>
+              <a:ea typeface="+mn-ea"/>
+              <a:cs typeface="+mn-cs"/>
+            </a:endParaRPr>
+          </a:p>
+          <a:p>
+            <a:r>
+              <a:rPr lang="en-US" sz="1200" kern="1200" dirty="0">
+                <a:solidFill>
+                  <a:schemeClr val="tx1"/>
+                </a:solidFill>
+                <a:effectLst/>
+                <a:latin typeface="+mn-lt"/>
+                <a:ea typeface="+mn-ea"/>
+                <a:cs typeface="+mn-cs"/>
+              </a:rPr>
+              <a:t>Correlation seemed to improved with density, but ultimately, we need to try a multiscale correlation meaning combine both logs and try again. </a:t>
+            </a:r>
+          </a:p>
+          <a:p>
+            <a:endParaRPr lang="en-US" sz="1200" kern="1200" dirty="0">
+              <a:solidFill>
+                <a:schemeClr val="tx1"/>
+              </a:solidFill>
+              <a:effectLst/>
+              <a:latin typeface="+mn-lt"/>
+              <a:ea typeface="+mn-ea"/>
+              <a:cs typeface="+mn-cs"/>
+            </a:endParaRPr>
+          </a:p>
+          <a:p>
+            <a:pPr algn="ctr"/>
+            <a:r>
+              <a:rPr lang="en-US" sz="1200" kern="1200" dirty="0">
+                <a:solidFill>
+                  <a:schemeClr val="tx1"/>
+                </a:solidFill>
+                <a:effectLst/>
+                <a:latin typeface="+mn-lt"/>
+                <a:ea typeface="+mn-ea"/>
+                <a:cs typeface="+mn-cs"/>
+              </a:rPr>
+              <a:t>Change slide (to 7)</a:t>
+            </a:r>
+            <a:endParaRPr lang="en-AU" sz="1200" kern="1200" dirty="0">
+              <a:solidFill>
+                <a:schemeClr val="tx1"/>
+              </a:solidFill>
+              <a:effectLst/>
+              <a:latin typeface="+mn-lt"/>
+              <a:ea typeface="+mn-ea"/>
+              <a:cs typeface="+mn-cs"/>
+            </a:endParaRPr>
+          </a:p>
+          <a:p>
+            <a:pPr marL="0" marR="0" lvl="0" indent="0" algn="l" defTabSz="914400" rtl="0" eaLnBrk="1" fontAlgn="auto" latinLnBrk="0" hangingPunct="1">
+              <a:lnSpc>
+                <a:spcPct val="100000"/>
+              </a:lnSpc>
+              <a:spcBef>
+                <a:spcPts val="0"/>
+              </a:spcBef>
+              <a:spcAft>
+                <a:spcPts val="0"/>
+              </a:spcAft>
+              <a:buClrTx/>
+              <a:buSzTx/>
+              <a:buFontTx/>
+              <a:buNone/>
+              <a:tabLst/>
+              <a:defRPr/>
+            </a:pPr>
+            <a:endParaRPr lang="en-AU" sz="1200" kern="1200" dirty="0">
+              <a:solidFill>
+                <a:schemeClr val="tx1"/>
+              </a:solidFill>
+              <a:effectLst/>
+              <a:latin typeface="+mn-lt"/>
+              <a:ea typeface="+mn-ea"/>
+              <a:cs typeface="+mn-cs"/>
+            </a:endParaRPr>
+          </a:p>
+          <a:p>
+            <a:endParaRPr lang="en-AU" dirty="0"/>
+          </a:p>
+        </p:txBody>
+      </p:sp>
+      <p:sp>
+        <p:nvSpPr>
+          <p:cNvPr id="4" name="Slide Number Placeholder 3"/>
+          <p:cNvSpPr>
+            <a:spLocks noGrp="1"/>
+          </p:cNvSpPr>
+          <p:nvPr>
+            <p:ph type="sldNum" sz="quarter" idx="5"/>
+          </p:nvPr>
+        </p:nvSpPr>
+        <p:spPr/>
+        <p:txBody>
+          <a:bodyPr/>
+          <a:lstStyle/>
+          <a:p>
+            <a:fld id="{ECE52E84-FB22-4E35-BFBF-ED86E4A36906}" type="slidenum">
+              <a:rPr lang="en-AU" smtClean="0"/>
+              <a:t>5</a:t>
+            </a:fld>
+            <a:endParaRPr lang="en-AU"/>
+          </a:p>
+        </p:txBody>
+      </p:sp>
+    </p:spTree>
+    <p:extLst>
+      <p:ext uri="{BB962C8B-B14F-4D97-AF65-F5344CB8AC3E}">
+        <p14:creationId xmlns:p14="http://schemas.microsoft.com/office/powerpoint/2010/main" val="2223399768"/>
+      </p:ext>
+    </p:extLst>
+  </p:cSld>
+  <p:clrMapOvr>
+    <a:masterClrMapping/>
+  </p:clrMapOvr>
+</p:notes>
+</file>
+
+<file path=ppt/notesSlides/notesSlide6.xml><?xml version="1.0" encoding="utf-8"?>
+<p:notes xmlns:a="http://schemas.openxmlformats.org/drawingml/2006/main" xmlns:r="http://schemas.openxmlformats.org/officeDocument/2006/relationships" xmlns:p="http://schemas.openxmlformats.org/presentationml/2006/main">
+  <p:cSld>
+    <p:spTree>
+      <p:nvGrpSpPr>
+        <p:cNvPr id="1" name=""/>
+        <p:cNvGrpSpPr/>
+        <p:nvPr/>
+      </p:nvGrpSpPr>
+      <p:grpSpPr>
+        <a:xfrm>
+          <a:off x="0" y="0"/>
+          <a:ext cx="0" cy="0"/>
+          <a:chOff x="0" y="0"/>
+          <a:chExt cx="0" cy="0"/>
+        </a:xfrm>
+      </p:grpSpPr>
+      <p:sp>
+        <p:nvSpPr>
+          <p:cNvPr id="2" name="Slide Image Placeholder 1"/>
+          <p:cNvSpPr>
+            <a:spLocks noGrp="1" noRot="1" noChangeAspect="1"/>
+          </p:cNvSpPr>
+          <p:nvPr>
+            <p:ph type="sldImg"/>
+          </p:nvPr>
+        </p:nvSpPr>
+        <p:spPr/>
+      </p:sp>
+      <p:sp>
+        <p:nvSpPr>
+          <p:cNvPr id="3" name="Notes Placeholder 2"/>
+          <p:cNvSpPr>
+            <a:spLocks noGrp="1"/>
+          </p:cNvSpPr>
+          <p:nvPr>
+            <p:ph type="body" idx="1"/>
+          </p:nvPr>
+        </p:nvSpPr>
+        <p:spPr/>
+        <p:txBody>
+          <a:bodyPr/>
+          <a:lstStyle/>
+          <a:p>
+            <a:pPr marL="0" marR="0" lvl="0" indent="0" algn="l" defTabSz="914400" rtl="0" eaLnBrk="1" fontAlgn="auto" latinLnBrk="0" hangingPunct="1">
+              <a:lnSpc>
+                <a:spcPct val="100000"/>
+              </a:lnSpc>
+              <a:spcBef>
+                <a:spcPts val="0"/>
+              </a:spcBef>
+              <a:spcAft>
+                <a:spcPts val="0"/>
+              </a:spcAft>
+              <a:buClrTx/>
+              <a:buSzTx/>
+              <a:buFontTx/>
+              <a:buNone/>
+              <a:tabLst/>
+              <a:defRPr/>
+            </a:pPr>
+            <a:r>
+              <a:rPr lang="en-US" sz="1200" kern="1200" dirty="0">
+                <a:solidFill>
+                  <a:schemeClr val="tx1"/>
+                </a:solidFill>
+                <a:effectLst/>
+                <a:latin typeface="+mn-lt"/>
+                <a:ea typeface="+mn-ea"/>
+                <a:cs typeface="+mn-cs"/>
+              </a:rPr>
+              <a:t>Martin built on Leo’s excellent work and added some interactive slider widgets which we will have a look at now ..  </a:t>
+            </a:r>
+            <a:endParaRPr lang="en-AU" sz="1200" kern="1200" dirty="0">
+              <a:solidFill>
+                <a:schemeClr val="tx1"/>
+              </a:solidFill>
+              <a:effectLst/>
+              <a:latin typeface="+mn-lt"/>
+              <a:ea typeface="+mn-ea"/>
+              <a:cs typeface="+mn-cs"/>
+            </a:endParaRPr>
+          </a:p>
+        </p:txBody>
+      </p:sp>
+      <p:sp>
+        <p:nvSpPr>
+          <p:cNvPr id="4" name="Slide Number Placeholder 3"/>
+          <p:cNvSpPr>
+            <a:spLocks noGrp="1"/>
+          </p:cNvSpPr>
+          <p:nvPr>
+            <p:ph type="sldNum" sz="quarter" idx="5"/>
+          </p:nvPr>
+        </p:nvSpPr>
+        <p:spPr/>
+        <p:txBody>
+          <a:bodyPr/>
+          <a:lstStyle/>
+          <a:p>
+            <a:fld id="{ECE52E84-FB22-4E35-BFBF-ED86E4A36906}" type="slidenum">
+              <a:rPr lang="en-AU" smtClean="0"/>
+              <a:t>6</a:t>
+            </a:fld>
+            <a:endParaRPr lang="en-AU"/>
+          </a:p>
+        </p:txBody>
+      </p:sp>
+    </p:spTree>
+    <p:extLst>
+      <p:ext uri="{BB962C8B-B14F-4D97-AF65-F5344CB8AC3E}">
+        <p14:creationId xmlns:p14="http://schemas.microsoft.com/office/powerpoint/2010/main" val="2335017898"/>
+      </p:ext>
+    </p:extLst>
+  </p:cSld>
+  <p:clrMapOvr>
+    <a:masterClrMapping/>
+  </p:clrMapOvr>
+</p:notes>
+</file>
+
+<file path=ppt/notesSlides/notesSlide7.xml><?xml version="1.0" encoding="utf-8"?>
+<p:notes xmlns:a="http://schemas.openxmlformats.org/drawingml/2006/main" xmlns:r="http://schemas.openxmlformats.org/officeDocument/2006/relationships" xmlns:p="http://schemas.openxmlformats.org/presentationml/2006/main">
+  <p:cSld>
+    <p:spTree>
+      <p:nvGrpSpPr>
+        <p:cNvPr id="1" name=""/>
+        <p:cNvGrpSpPr/>
+        <p:nvPr/>
+      </p:nvGrpSpPr>
+      <p:grpSpPr>
+        <a:xfrm>
+          <a:off x="0" y="0"/>
+          <a:ext cx="0" cy="0"/>
+          <a:chOff x="0" y="0"/>
+          <a:chExt cx="0" cy="0"/>
+        </a:xfrm>
+      </p:grpSpPr>
+      <p:sp>
+        <p:nvSpPr>
+          <p:cNvPr id="2" name="Slide Image Placeholder 1"/>
+          <p:cNvSpPr>
+            <a:spLocks noGrp="1" noRot="1" noChangeAspect="1"/>
+          </p:cNvSpPr>
+          <p:nvPr>
+            <p:ph type="sldImg"/>
+          </p:nvPr>
+        </p:nvSpPr>
+        <p:spPr/>
+      </p:sp>
+      <p:sp>
+        <p:nvSpPr>
+          <p:cNvPr id="3" name="Notes Placeholder 2"/>
+          <p:cNvSpPr>
+            <a:spLocks noGrp="1"/>
+          </p:cNvSpPr>
+          <p:nvPr>
+            <p:ph type="body" idx="1"/>
+          </p:nvPr>
+        </p:nvSpPr>
+        <p:spPr/>
+        <p:txBody>
+          <a:bodyPr/>
+          <a:lstStyle/>
+          <a:p>
+            <a:r>
+              <a:rPr lang="en-US" sz="1200" b="1" kern="1200" dirty="0">
+                <a:solidFill>
+                  <a:schemeClr val="tx1"/>
+                </a:solidFill>
+                <a:effectLst/>
+                <a:latin typeface="+mn-lt"/>
+                <a:ea typeface="+mn-ea"/>
+                <a:cs typeface="+mn-cs"/>
+              </a:rPr>
+              <a:t>In terms of Future work</a:t>
+            </a:r>
+            <a:endParaRPr lang="en-AU" sz="1200" b="1" kern="1200" dirty="0">
+              <a:solidFill>
+                <a:schemeClr val="tx1"/>
+              </a:solidFill>
+              <a:effectLst/>
+              <a:latin typeface="+mn-lt"/>
+              <a:ea typeface="+mn-ea"/>
+              <a:cs typeface="+mn-cs"/>
+            </a:endParaRPr>
+          </a:p>
+          <a:p>
+            <a:r>
+              <a:rPr lang="en-US" sz="1200" kern="1200" dirty="0">
+                <a:solidFill>
+                  <a:schemeClr val="tx1"/>
+                </a:solidFill>
+                <a:effectLst/>
+                <a:latin typeface="+mn-lt"/>
+                <a:ea typeface="+mn-ea"/>
+                <a:cs typeface="+mn-cs"/>
+              </a:rPr>
+              <a:t>There is much more that can be done here to further mold these initial concepts and code into more usable features ..</a:t>
+            </a:r>
+          </a:p>
+          <a:p>
+            <a:endParaRPr lang="en-AU" sz="1200" kern="1200" dirty="0">
+              <a:solidFill>
+                <a:schemeClr val="tx1"/>
+              </a:solidFill>
+              <a:effectLst/>
+              <a:latin typeface="+mn-lt"/>
+              <a:ea typeface="+mn-ea"/>
+              <a:cs typeface="+mn-cs"/>
+            </a:endParaRPr>
+          </a:p>
+          <a:p>
+            <a:r>
+              <a:rPr lang="en-US" sz="1200" kern="1200" dirty="0">
+                <a:solidFill>
+                  <a:schemeClr val="tx1"/>
+                </a:solidFill>
+                <a:effectLst/>
+                <a:latin typeface="+mn-lt"/>
+                <a:ea typeface="+mn-ea"/>
+                <a:cs typeface="+mn-cs"/>
+              </a:rPr>
+              <a:t> </a:t>
+            </a:r>
+            <a:endParaRPr lang="en-AU" sz="1200" kern="1200" dirty="0">
+              <a:solidFill>
+                <a:schemeClr val="tx1"/>
+              </a:solidFill>
+              <a:effectLst/>
+              <a:latin typeface="+mn-lt"/>
+              <a:ea typeface="+mn-ea"/>
+              <a:cs typeface="+mn-cs"/>
+            </a:endParaRPr>
+          </a:p>
+          <a:p>
+            <a:r>
+              <a:rPr lang="en-US" sz="1200" b="1" kern="1200" dirty="0">
+                <a:solidFill>
+                  <a:schemeClr val="tx1"/>
+                </a:solidFill>
+                <a:effectLst/>
+                <a:latin typeface="+mn-lt"/>
+                <a:ea typeface="+mn-ea"/>
+                <a:cs typeface="+mn-cs"/>
+              </a:rPr>
+              <a:t>So in Conclusion ..</a:t>
+            </a:r>
+            <a:endParaRPr lang="en-AU" sz="1200" b="1" kern="1200" dirty="0">
+              <a:solidFill>
+                <a:schemeClr val="tx1"/>
+              </a:solidFill>
+              <a:effectLst/>
+              <a:latin typeface="+mn-lt"/>
+              <a:ea typeface="+mn-ea"/>
+              <a:cs typeface="+mn-cs"/>
+            </a:endParaRPr>
+          </a:p>
+          <a:p>
+            <a:r>
+              <a:rPr lang="en-US" sz="1200" kern="1200" dirty="0">
+                <a:solidFill>
+                  <a:schemeClr val="tx1"/>
+                </a:solidFill>
+                <a:effectLst/>
+                <a:latin typeface="+mn-lt"/>
+                <a:ea typeface="+mn-ea"/>
+                <a:cs typeface="+mn-cs"/>
+              </a:rPr>
+              <a:t>We think tessellations  could rapidly  and  reproducibly  resolve  subtle  or  subjective  detail  in  coal rocks  and other commodities!, obviously, it needs a bit more work.</a:t>
+            </a:r>
+            <a:endParaRPr lang="en-AU" sz="1200" kern="1200" dirty="0">
+              <a:solidFill>
+                <a:schemeClr val="tx1"/>
+              </a:solidFill>
+              <a:effectLst/>
+              <a:latin typeface="+mn-lt"/>
+              <a:ea typeface="+mn-ea"/>
+              <a:cs typeface="+mn-cs"/>
+            </a:endParaRPr>
+          </a:p>
+          <a:p>
+            <a:endParaRPr lang="en-US" sz="1200" kern="1200" dirty="0">
+              <a:solidFill>
+                <a:schemeClr val="tx1"/>
+              </a:solidFill>
+              <a:effectLst/>
+              <a:latin typeface="+mn-lt"/>
+              <a:ea typeface="+mn-ea"/>
+              <a:cs typeface="+mn-cs"/>
+            </a:endParaRPr>
+          </a:p>
+          <a:p>
+            <a:r>
+              <a:rPr lang="en-US" sz="1200" kern="1200" dirty="0">
+                <a:solidFill>
+                  <a:schemeClr val="tx1"/>
+                </a:solidFill>
+                <a:effectLst/>
+                <a:latin typeface="+mn-lt"/>
+                <a:ea typeface="+mn-ea"/>
+                <a:cs typeface="+mn-cs"/>
+              </a:rPr>
+              <a:t>WE think this technique should therefore be  considered  an  important  addition  to the  mining  and exploration  geoscientists toolkit. Especially where large amounts of the lithological data are derived from 1m composite intervals of rock chips.</a:t>
+            </a:r>
+          </a:p>
+          <a:p>
+            <a:endParaRPr lang="en-AU" sz="1200" kern="1200" dirty="0">
+              <a:solidFill>
+                <a:schemeClr val="tx1"/>
+              </a:solidFill>
+              <a:effectLst/>
+              <a:latin typeface="+mn-lt"/>
+              <a:ea typeface="+mn-ea"/>
+              <a:cs typeface="+mn-cs"/>
+            </a:endParaRPr>
+          </a:p>
+          <a:p>
+            <a:r>
+              <a:rPr lang="en-US" sz="1200" kern="1200" dirty="0">
+                <a:solidFill>
+                  <a:schemeClr val="tx1"/>
+                </a:solidFill>
+                <a:effectLst/>
+                <a:latin typeface="+mn-lt"/>
+                <a:ea typeface="+mn-ea"/>
+                <a:cs typeface="+mn-cs"/>
+              </a:rPr>
+              <a:t>So, on behalf of the team, a MASSIVE thankyou to all that have been involved.  Thankyou to the organizers of the T2020 conference! Thankyou to </a:t>
+            </a:r>
+            <a:r>
+              <a:rPr lang="en-US" sz="1200" kern="1200" dirty="0" err="1">
+                <a:solidFill>
+                  <a:schemeClr val="tx1"/>
+                </a:solidFill>
+                <a:effectLst/>
+                <a:latin typeface="+mn-lt"/>
+                <a:ea typeface="+mn-ea"/>
+                <a:cs typeface="+mn-cs"/>
+              </a:rPr>
+              <a:t>Philippo</a:t>
+            </a:r>
+            <a:r>
+              <a:rPr lang="en-US" sz="1200" kern="1200" dirty="0">
+                <a:solidFill>
+                  <a:schemeClr val="tx1"/>
+                </a:solidFill>
+                <a:effectLst/>
+                <a:latin typeface="+mn-lt"/>
+                <a:ea typeface="+mn-ea"/>
+                <a:cs typeface="+mn-cs"/>
+              </a:rPr>
+              <a:t> for his guidance, and also the energy for this project generated by folks like </a:t>
+            </a:r>
+            <a:r>
+              <a:rPr lang="en-US" sz="1200" kern="1200" dirty="0" err="1">
+                <a:solidFill>
+                  <a:schemeClr val="tx1"/>
+                </a:solidFill>
+                <a:effectLst/>
+                <a:latin typeface="+mn-lt"/>
+                <a:ea typeface="+mn-ea"/>
+                <a:cs typeface="+mn-cs"/>
+              </a:rPr>
+              <a:t>DougMc</a:t>
+            </a:r>
+            <a:r>
+              <a:rPr lang="en-US" sz="1200" kern="1200" dirty="0">
+                <a:solidFill>
+                  <a:schemeClr val="tx1"/>
+                </a:solidFill>
+                <a:effectLst/>
+                <a:latin typeface="+mn-lt"/>
+                <a:ea typeface="+mn-ea"/>
+                <a:cs typeface="+mn-cs"/>
+              </a:rPr>
+              <a:t>, thanks to Brendon for some of his technical resources and to all of you that have contributed in some way to the project, thankyou!</a:t>
+            </a:r>
+          </a:p>
+          <a:p>
+            <a:endParaRPr lang="en-AU" sz="1200" kern="1200" dirty="0">
+              <a:solidFill>
+                <a:schemeClr val="tx1"/>
+              </a:solidFill>
+              <a:effectLst/>
+              <a:latin typeface="+mn-lt"/>
+              <a:ea typeface="+mn-ea"/>
+              <a:cs typeface="+mn-cs"/>
+            </a:endParaRPr>
+          </a:p>
+          <a:p>
+            <a:r>
+              <a:rPr lang="en-US" sz="1200" kern="1200" dirty="0">
+                <a:solidFill>
+                  <a:schemeClr val="tx1"/>
+                </a:solidFill>
+                <a:effectLst/>
+                <a:latin typeface="+mn-lt"/>
+                <a:ea typeface="+mn-ea"/>
+                <a:cs typeface="+mn-cs"/>
+              </a:rPr>
+              <a:t>Finally, to the Software underground community, we bequeath to you, the code, the ideas, and the gorgeous mosaic plots generated by our team.</a:t>
+            </a:r>
+            <a:endParaRPr lang="en-AU" sz="1200" kern="1200" dirty="0">
+              <a:solidFill>
+                <a:schemeClr val="tx1"/>
+              </a:solidFill>
+              <a:effectLst/>
+              <a:latin typeface="+mn-lt"/>
+              <a:ea typeface="+mn-ea"/>
+              <a:cs typeface="+mn-cs"/>
+            </a:endParaRPr>
+          </a:p>
+          <a:p>
+            <a:endParaRPr lang="en-US" sz="1200" kern="1200" dirty="0">
+              <a:solidFill>
+                <a:schemeClr val="tx1"/>
+              </a:solidFill>
+              <a:effectLst/>
+              <a:latin typeface="+mn-lt"/>
+              <a:ea typeface="+mn-ea"/>
+              <a:cs typeface="+mn-cs"/>
+            </a:endParaRPr>
+          </a:p>
+          <a:p>
+            <a:r>
+              <a:rPr lang="en-US" sz="1200" kern="1200" dirty="0">
+                <a:solidFill>
+                  <a:schemeClr val="tx1"/>
+                </a:solidFill>
+                <a:effectLst/>
+                <a:latin typeface="+mn-lt"/>
+                <a:ea typeface="+mn-ea"/>
+                <a:cs typeface="+mn-cs"/>
+              </a:rPr>
+              <a:t>That’s it!</a:t>
+            </a:r>
+          </a:p>
+          <a:p>
+            <a:endParaRPr lang="en-US" sz="1200" kern="1200" dirty="0">
+              <a:solidFill>
+                <a:schemeClr val="tx1"/>
+              </a:solidFill>
+              <a:effectLst/>
+              <a:latin typeface="+mn-lt"/>
+              <a:ea typeface="+mn-ea"/>
+              <a:cs typeface="+mn-cs"/>
+            </a:endParaRPr>
+          </a:p>
+          <a:p>
+            <a:r>
+              <a:rPr lang="en-US" sz="1200" kern="1200" dirty="0">
+                <a:solidFill>
+                  <a:schemeClr val="tx1"/>
+                </a:solidFill>
+                <a:effectLst/>
+                <a:latin typeface="+mn-lt"/>
+                <a:ea typeface="+mn-ea"/>
+                <a:cs typeface="+mn-cs"/>
+              </a:rPr>
+              <a:t>Again, Thanks goodnight.</a:t>
+            </a:r>
+            <a:endParaRPr lang="en-AU" sz="1200" kern="1200" dirty="0">
+              <a:solidFill>
+                <a:schemeClr val="tx1"/>
+              </a:solidFill>
+              <a:effectLst/>
+              <a:latin typeface="+mn-lt"/>
+              <a:ea typeface="+mn-ea"/>
+              <a:cs typeface="+mn-cs"/>
+            </a:endParaRPr>
+          </a:p>
+        </p:txBody>
+      </p:sp>
+      <p:sp>
+        <p:nvSpPr>
+          <p:cNvPr id="4" name="Slide Number Placeholder 3"/>
+          <p:cNvSpPr>
+            <a:spLocks noGrp="1"/>
+          </p:cNvSpPr>
+          <p:nvPr>
+            <p:ph type="sldNum" sz="quarter" idx="5"/>
+          </p:nvPr>
+        </p:nvSpPr>
+        <p:spPr/>
+        <p:txBody>
+          <a:bodyPr/>
+          <a:lstStyle/>
+          <a:p>
+            <a:fld id="{ECE52E84-FB22-4E35-BFBF-ED86E4A36906}" type="slidenum">
+              <a:rPr lang="en-AU" smtClean="0"/>
+              <a:t>7</a:t>
+            </a:fld>
+            <a:endParaRPr lang="en-AU"/>
+          </a:p>
+        </p:txBody>
+      </p:sp>
+    </p:spTree>
+    <p:extLst>
+      <p:ext uri="{BB962C8B-B14F-4D97-AF65-F5344CB8AC3E}">
+        <p14:creationId xmlns:p14="http://schemas.microsoft.com/office/powerpoint/2010/main" val="3726774881"/>
+      </p:ext>
+    </p:extLst>
+  </p:cSld>
+  <p:clrMapOvr>
+    <a:masterClrMapping/>
+  </p:clrMapOvr>
+</p:notes>
 </file>
 
 <file path=ppt/slideLayouts/slideLayout1.xml><?xml version="1.0" encoding="utf-8"?>
@@ -3499,7 +5809,7 @@
           <p:nvPr/>
         </p:nvPicPr>
         <p:blipFill>
-          <a:blip r:embed="rId2">
+          <a:blip r:embed="rId3">
             <a:extLst>
               <a:ext uri="{28A0092B-C50C-407E-A947-70E740481C1C}">
                 <a14:useLocalDpi xmlns:a14="http://schemas.microsoft.com/office/drawing/2010/main" val="0"/>
@@ -3699,7 +6009,7 @@
           <p:nvPr/>
         </p:nvPicPr>
         <p:blipFill>
-          <a:blip r:embed="rId2"/>
+          <a:blip r:embed="rId3"/>
           <a:stretch>
             <a:fillRect/>
           </a:stretch>
@@ -3880,10 +6190,10 @@
       </p:sp>
       <p:pic>
         <p:nvPicPr>
-          <p:cNvPr id="9" name="Picture 8" descr="A screenshot of a cell phone&#10;&#10;Description automatically generated">
-            <a:extLst>
-              <a:ext uri="{FF2B5EF4-FFF2-40B4-BE49-F238E27FC236}">
-                <a16:creationId xmlns:a16="http://schemas.microsoft.com/office/drawing/2014/main" id="{B8D74BF3-693D-41B9-8E73-0F363BB192EA}"/>
+          <p:cNvPr id="7" name="Picture 6">
+            <a:extLst>
+              <a:ext uri="{FF2B5EF4-FFF2-40B4-BE49-F238E27FC236}">
+                <a16:creationId xmlns:a16="http://schemas.microsoft.com/office/drawing/2014/main" id="{CEBE1DF3-D39B-48C8-84E9-BEB189038579}"/>
               </a:ext>
             </a:extLst>
           </p:cNvPr>
@@ -3893,207 +6203,7 @@
           <p:nvPr/>
         </p:nvPicPr>
         <p:blipFill>
-          <a:blip r:embed="rId2">
-            <a:extLst>
-              <a:ext uri="{28A0092B-C50C-407E-A947-70E740481C1C}">
-                <a14:useLocalDpi xmlns:a14="http://schemas.microsoft.com/office/drawing/2010/main" val="0"/>
-              </a:ext>
-            </a:extLst>
-          </a:blip>
-          <a:stretch>
-            <a:fillRect/>
-          </a:stretch>
-        </p:blipFill>
-        <p:spPr>
-          <a:xfrm>
-            <a:off x="2699009" y="643467"/>
-            <a:ext cx="6793982" cy="5571066"/>
-          </a:xfrm>
-          <a:prstGeom prst="rect">
-            <a:avLst/>
-          </a:prstGeom>
-        </p:spPr>
-      </p:pic>
-    </p:spTree>
-    <p:extLst>
-      <p:ext uri="{BB962C8B-B14F-4D97-AF65-F5344CB8AC3E}">
-        <p14:creationId xmlns:p14="http://schemas.microsoft.com/office/powerpoint/2010/main" val="171862849"/>
-      </p:ext>
-    </p:extLst>
-  </p:cSld>
-  <p:clrMapOvr>
-    <a:masterClrMapping/>
-  </p:clrMapOvr>
-</p:sld>
-</file>
-
-<file path=ppt/slides/slide4.xml><?xml version="1.0" encoding="utf-8"?>
-<p:sld xmlns:a="http://schemas.openxmlformats.org/drawingml/2006/main" xmlns:r="http://schemas.openxmlformats.org/officeDocument/2006/relationships" xmlns:p="http://schemas.openxmlformats.org/presentationml/2006/main">
-  <p:cSld>
-    <p:bg>
-      <p:bgPr>
-        <a:solidFill>
-          <a:schemeClr val="bg1"/>
-        </a:solidFill>
-        <a:effectLst/>
-      </p:bgPr>
-    </p:bg>
-    <p:spTree>
-      <p:nvGrpSpPr>
-        <p:cNvPr id="1" name=""/>
-        <p:cNvGrpSpPr/>
-        <p:nvPr/>
-      </p:nvGrpSpPr>
-      <p:grpSpPr>
-        <a:xfrm>
-          <a:off x="0" y="0"/>
-          <a:ext cx="0" cy="0"/>
-          <a:chOff x="0" y="0"/>
-          <a:chExt cx="0" cy="0"/>
-        </a:xfrm>
-      </p:grpSpPr>
-      <p:sp>
-        <p:nvSpPr>
-          <p:cNvPr id="14" name="Rectangle 13">
-            <a:extLst>
-              <a:ext uri="{FF2B5EF4-FFF2-40B4-BE49-F238E27FC236}">
-                <a16:creationId xmlns:a16="http://schemas.microsoft.com/office/drawing/2014/main" id="{32BC26D8-82FB-445E-AA49-62A77D7C1EE0}"/>
-              </a:ext>
-              <a:ext uri="{C183D7F6-B498-43B3-948B-1728B52AA6E4}">
-                <adec:decorative xmlns:adec="http://schemas.microsoft.com/office/drawing/2017/decorative" val="1"/>
-              </a:ext>
-            </a:extLst>
-          </p:cNvPr>
-          <p:cNvSpPr>
-            <a:spLocks noGrp="1" noRot="1" noChangeAspect="1" noMove="1" noResize="1" noEditPoints="1" noAdjustHandles="1" noChangeArrowheads="1" noChangeShapeType="1" noTextEdit="1"/>
-          </p:cNvSpPr>
-          <p:nvPr>
-            <p:extLst>
-              <p:ext uri="{386F3935-93C4-4BCD-93E2-E3B085C9AB24}">
-                <p16:designElem xmlns:p16="http://schemas.microsoft.com/office/powerpoint/2015/main" val="1"/>
-              </p:ext>
-            </p:extLst>
-          </p:nvPr>
-        </p:nvSpPr>
-        <p:spPr>
-          <a:xfrm>
-            <a:off x="0" y="0"/>
-            <a:ext cx="12192000" cy="6858000"/>
-          </a:xfrm>
-          <a:prstGeom prst="rect">
-            <a:avLst/>
-          </a:prstGeom>
-          <a:solidFill>
-            <a:srgbClr val="7C0F39"/>
-          </a:solidFill>
-          <a:ln>
-            <a:noFill/>
-          </a:ln>
-        </p:spPr>
-        <p:style>
-          <a:lnRef idx="2">
-            <a:schemeClr val="accent1">
-              <a:shade val="50000"/>
-            </a:schemeClr>
-          </a:lnRef>
-          <a:fillRef idx="1">
-            <a:schemeClr val="accent1"/>
-          </a:fillRef>
-          <a:effectRef idx="0">
-            <a:schemeClr val="accent1"/>
-          </a:effectRef>
-          <a:fontRef idx="minor">
-            <a:schemeClr val="lt1"/>
-          </a:fontRef>
-        </p:style>
-        <p:txBody>
-          <a:bodyPr rtlCol="0" anchor="ctr"/>
-          <a:lstStyle/>
-          <a:p>
-            <a:pPr algn="ctr"/>
-            <a:endParaRPr lang="en-US"/>
-          </a:p>
-        </p:txBody>
-      </p:sp>
-      <p:sp>
-        <p:nvSpPr>
-          <p:cNvPr id="16" name="Rectangle 15">
-            <a:extLst>
-              <a:ext uri="{FF2B5EF4-FFF2-40B4-BE49-F238E27FC236}">
-                <a16:creationId xmlns:a16="http://schemas.microsoft.com/office/drawing/2014/main" id="{CB44330D-EA18-4254-AA95-EB49948539B8}"/>
-              </a:ext>
-              <a:ext uri="{C183D7F6-B498-43B3-948B-1728B52AA6E4}">
-                <adec:decorative xmlns:adec="http://schemas.microsoft.com/office/drawing/2017/decorative" val="1"/>
-              </a:ext>
-            </a:extLst>
-          </p:cNvPr>
-          <p:cNvSpPr>
-            <a:spLocks noGrp="1" noRot="1" noChangeAspect="1" noMove="1" noResize="1" noEditPoints="1" noAdjustHandles="1" noChangeArrowheads="1" noChangeShapeType="1" noTextEdit="1"/>
-          </p:cNvSpPr>
-          <p:nvPr>
-            <p:extLst>
-              <p:ext uri="{386F3935-93C4-4BCD-93E2-E3B085C9AB24}">
-                <p16:designElem xmlns:p16="http://schemas.microsoft.com/office/powerpoint/2015/main" val="1"/>
-              </p:ext>
-            </p:extLst>
-          </p:nvPr>
-        </p:nvSpPr>
-        <p:spPr>
-          <a:xfrm>
-            <a:off x="477012" y="480060"/>
-            <a:ext cx="11237976" cy="5897880"/>
-          </a:xfrm>
-          <a:prstGeom prst="rect">
-            <a:avLst/>
-          </a:prstGeom>
-          <a:solidFill>
-            <a:srgbClr val="FFFFFF"/>
-          </a:solidFill>
-          <a:ln>
-            <a:noFill/>
-          </a:ln>
-        </p:spPr>
-        <p:style>
-          <a:lnRef idx="2">
-            <a:schemeClr val="accent1">
-              <a:shade val="50000"/>
-            </a:schemeClr>
-          </a:lnRef>
-          <a:fillRef idx="1">
-            <a:schemeClr val="accent1"/>
-          </a:fillRef>
-          <a:effectRef idx="0">
-            <a:schemeClr val="accent1"/>
-          </a:effectRef>
-          <a:fontRef idx="minor">
-            <a:schemeClr val="lt1"/>
-          </a:fontRef>
-        </p:style>
-        <p:txBody>
-          <a:bodyPr rtlCol="0" anchor="ctr"/>
-          <a:lstStyle/>
-          <a:p>
-            <a:pPr algn="ctr"/>
-            <a:endParaRPr lang="en-US"/>
-          </a:p>
-        </p:txBody>
-      </p:sp>
-      <p:pic>
-        <p:nvPicPr>
-          <p:cNvPr id="7" name="Picture 6">
-            <a:extLst>
-              <a:ext uri="{FF2B5EF4-FFF2-40B4-BE49-F238E27FC236}">
-                <a16:creationId xmlns:a16="http://schemas.microsoft.com/office/drawing/2014/main" id="{CEBE1DF3-D39B-48C8-84E9-BEB189038579}"/>
-              </a:ext>
-            </a:extLst>
-          </p:cNvPr>
-          <p:cNvPicPr>
-            <a:picLocks noChangeAspect="1"/>
-          </p:cNvPicPr>
-          <p:nvPr/>
-        </p:nvPicPr>
-        <p:blipFill>
-          <a:blip r:embed="rId2"/>
+          <a:blip r:embed="rId3"/>
           <a:stretch>
             <a:fillRect/>
           </a:stretch>
@@ -4124,7 +6234,7 @@
           <p:nvPr/>
         </p:nvPicPr>
         <p:blipFill>
-          <a:blip r:embed="rId3"/>
+          <a:blip r:embed="rId4"/>
           <a:stretch>
             <a:fillRect/>
           </a:stretch>
@@ -4142,6 +6252,85 @@
           </a:ln>
         </p:spPr>
       </p:pic>
+      <p:sp>
+        <p:nvSpPr>
+          <p:cNvPr id="2" name="Rectangle 1">
+            <a:extLst>
+              <a:ext uri="{FF2B5EF4-FFF2-40B4-BE49-F238E27FC236}">
+                <a16:creationId xmlns:a16="http://schemas.microsoft.com/office/drawing/2014/main" id="{48758964-3A41-4438-A3A9-22A67338A4F5}"/>
+              </a:ext>
+            </a:extLst>
+          </p:cNvPr>
+          <p:cNvSpPr/>
+          <p:nvPr/>
+        </p:nvSpPr>
+        <p:spPr>
+          <a:xfrm>
+            <a:off x="8792632" y="660568"/>
+            <a:ext cx="2738967" cy="1600438"/>
+          </a:xfrm>
+          <a:prstGeom prst="rect">
+            <a:avLst/>
+          </a:prstGeom>
+        </p:spPr>
+        <p:txBody>
+          <a:bodyPr wrap="square">
+            <a:spAutoFit/>
+          </a:bodyPr>
+          <a:lstStyle/>
+          <a:p>
+            <a:r>
+              <a:rPr lang="en-US" b="1" dirty="0"/>
+              <a:t>Libraries in used ..</a:t>
+            </a:r>
+            <a:endParaRPr lang="en-US" sz="1600" b="1" dirty="0"/>
+          </a:p>
+          <a:p>
+            <a:pPr lvl="1"/>
+            <a:r>
+              <a:rPr lang="en-US" sz="1600" dirty="0"/>
+              <a:t>Numpy</a:t>
+            </a:r>
+            <a:endParaRPr lang="en-AU" sz="1600" dirty="0"/>
+          </a:p>
+          <a:p>
+            <a:pPr lvl="1"/>
+            <a:r>
+              <a:rPr lang="en-US" sz="1600" dirty="0"/>
+              <a:t>Pandas</a:t>
+            </a:r>
+            <a:endParaRPr lang="en-AU" sz="1600" dirty="0"/>
+          </a:p>
+          <a:p>
+            <a:pPr lvl="1"/>
+            <a:r>
+              <a:rPr lang="en-US" sz="1600" dirty="0"/>
+              <a:t>Matplotlib</a:t>
+            </a:r>
+            <a:endParaRPr lang="en-AU" sz="1600" dirty="0"/>
+          </a:p>
+          <a:p>
+            <a:pPr lvl="1"/>
+            <a:r>
+              <a:rPr lang="en-US" sz="1600" dirty="0" err="1"/>
+              <a:t>Scipy</a:t>
+            </a:r>
+            <a:endParaRPr lang="en-AU" sz="1600" dirty="0"/>
+          </a:p>
+          <a:p>
+            <a:pPr lvl="1"/>
+            <a:r>
+              <a:rPr lang="en-US" sz="1600" dirty="0" err="1"/>
+              <a:t>Pywt</a:t>
+            </a:r>
+            <a:r>
+              <a:rPr lang="en-US" sz="1600" dirty="0"/>
+              <a:t> (for the CWT)</a:t>
+            </a:r>
+            <a:endParaRPr lang="en-AU" sz="2400" dirty="0"/>
+          </a:p>
+        </p:txBody>
+      </p:sp>
     </p:spTree>
     <p:extLst>
       <p:ext uri="{BB962C8B-B14F-4D97-AF65-F5344CB8AC3E}">
@@ -4205,6 +6394,51 @@
                       </p:childTnLst>
                     </p:cTn>
                   </p:par>
+                  <p:par>
+                    <p:cTn id="7" fill="hold">
+                      <p:stCondLst>
+                        <p:cond delay="indefinite"/>
+                      </p:stCondLst>
+                      <p:childTnLst>
+                        <p:par>
+                          <p:cTn id="8" fill="hold">
+                            <p:stCondLst>
+                              <p:cond delay="0"/>
+                            </p:stCondLst>
+                            <p:childTnLst>
+                              <p:par>
+                                <p:cTn id="9" presetID="1" presetClass="entr" presetSubtype="0" fill="hold" grpId="0" nodeType="clickEffect">
+                                  <p:stCondLst>
+                                    <p:cond delay="0"/>
+                                  </p:stCondLst>
+                                  <p:childTnLst>
+                                    <p:set>
+                                      <p:cBhvr>
+                                        <p:cTn id="10" dur="1" fill="hold">
+                                          <p:stCondLst>
+                                            <p:cond delay="0"/>
+                                          </p:stCondLst>
+                                        </p:cTn>
+                                        <p:tgtEl>
+                                          <p:spTgt spid="2"/>
+                                        </p:tgtEl>
+                                        <p:attrNameLst>
+                                          <p:attrName>style.visibility</p:attrName>
+                                        </p:attrNameLst>
+                                      </p:cBhvr>
+                                      <p:to>
+                                        <p:strVal val="visible"/>
+                                      </p:to>
+                                    </p:set>
+                                  </p:childTnLst>
+                                </p:cTn>
+                              </p:par>
+                            </p:childTnLst>
+                          </p:cTn>
+                        </p:par>
+                      </p:childTnLst>
+                    </p:cTn>
+                  </p:par>
                 </p:childTnLst>
               </p:cTn>
               <p:prevCondLst>
@@ -4226,11 +6460,14 @@
         </p:cTn>
       </p:par>
     </p:tnLst>
+    <p:bldLst>
+      <p:bldP spid="2" grpId="0"/>
+    </p:bldLst>
   </p:timing>
 </p:sld>
 </file>
 
-<file path=ppt/slides/slide5.xml><?xml version="1.0" encoding="utf-8"?>
+<file path=ppt/slides/slide4.xml><?xml version="1.0" encoding="utf-8"?>
 <p:sld xmlns:a="http://schemas.openxmlformats.org/drawingml/2006/main" xmlns:r="http://schemas.openxmlformats.org/officeDocument/2006/relationships" xmlns:p="http://schemas.openxmlformats.org/presentationml/2006/main">
   <p:cSld>
     <p:bg>
@@ -4395,7 +6632,7 @@
         </p:nvGrpSpPr>
         <p:grpSpPr>
           <a:xfrm>
-            <a:off x="477013" y="2027507"/>
+            <a:off x="477012" y="2058907"/>
             <a:ext cx="8681055" cy="4193457"/>
             <a:chOff x="477013" y="480060"/>
             <a:chExt cx="8681055" cy="4193457"/>
@@ -4416,7 +6653,7 @@
             <p:nvPr/>
           </p:nvPicPr>
           <p:blipFill>
-            <a:blip r:embed="rId2"/>
+            <a:blip r:embed="rId3"/>
             <a:stretch>
               <a:fillRect/>
             </a:stretch>
@@ -4446,7 +6683,7 @@
             <p:nvPr/>
           </p:nvPicPr>
           <p:blipFill rotWithShape="1">
-            <a:blip r:embed="rId3"/>
+            <a:blip r:embed="rId4"/>
             <a:srcRect l="19989" r="12043"/>
             <a:stretch/>
           </p:blipFill>
@@ -4476,7 +6713,7 @@
           <p:nvPr/>
         </p:nvPicPr>
         <p:blipFill>
-          <a:blip r:embed="rId4"/>
+          <a:blip r:embed="rId5"/>
           <a:stretch>
             <a:fillRect/>
           </a:stretch>
@@ -4579,7 +6816,7 @@
 </p:sld>
 </file>
 
-<file path=ppt/slides/slide6.xml><?xml version="1.0" encoding="utf-8"?>
+<file path=ppt/slides/slide5.xml><?xml version="1.0" encoding="utf-8"?>
 <p:sld xmlns:a="http://schemas.openxmlformats.org/drawingml/2006/main" xmlns:r="http://schemas.openxmlformats.org/officeDocument/2006/relationships" xmlns:p="http://schemas.openxmlformats.org/presentationml/2006/main">
   <p:cSld>
     <p:bg>
@@ -4730,10 +6967,1219 @@
           </a:p>
         </p:txBody>
       </p:sp>
+      <p:sp>
+        <p:nvSpPr>
+          <p:cNvPr id="12" name="Rectangle 11">
+            <a:extLst>
+              <a:ext uri="{FF2B5EF4-FFF2-40B4-BE49-F238E27FC236}">
+                <a16:creationId xmlns:a16="http://schemas.microsoft.com/office/drawing/2014/main" id="{73BA2D3B-A850-4C88-84AD-603B61578EE6}"/>
+              </a:ext>
+              <a:ext uri="{C183D7F6-B498-43B3-948B-1728B52AA6E4}">
+                <adec:decorative xmlns:adec="http://schemas.microsoft.com/office/drawing/2017/decorative" val="1"/>
+              </a:ext>
+            </a:extLst>
+          </p:cNvPr>
+          <p:cNvSpPr>
+            <a:spLocks noGrp="1" noRot="1" noChangeAspect="1" noMove="1" noResize="1" noEditPoints="1" noAdjustHandles="1" noChangeArrowheads="1" noChangeShapeType="1" noTextEdit="1"/>
+          </p:cNvSpPr>
+          <p:nvPr>
+            <p:extLst>
+              <p:ext uri="{386F3935-93C4-4BCD-93E2-E3B085C9AB24}">
+                <p16:designElem xmlns:p16="http://schemas.microsoft.com/office/powerpoint/2015/main" val="1"/>
+              </p:ext>
+            </p:extLst>
+          </p:nvPr>
+        </p:nvSpPr>
+        <p:spPr>
+          <a:xfrm>
+            <a:off x="0" y="0"/>
+            <a:ext cx="12192000" cy="6858000"/>
+          </a:xfrm>
+          <a:prstGeom prst="rect">
+            <a:avLst/>
+          </a:prstGeom>
+          <a:solidFill>
+            <a:srgbClr val="7C0F39"/>
+          </a:solidFill>
+          <a:ln>
+            <a:noFill/>
+          </a:ln>
+        </p:spPr>
+        <p:style>
+          <a:lnRef idx="2">
+            <a:schemeClr val="accent1">
+              <a:shade val="50000"/>
+            </a:schemeClr>
+          </a:lnRef>
+          <a:fillRef idx="1">
+            <a:schemeClr val="accent1"/>
+          </a:fillRef>
+          <a:effectRef idx="0">
+            <a:schemeClr val="accent1"/>
+          </a:effectRef>
+          <a:fontRef idx="minor">
+            <a:schemeClr val="lt1"/>
+          </a:fontRef>
+        </p:style>
+        <p:txBody>
+          <a:bodyPr rtlCol="0" anchor="ctr"/>
+          <a:lstStyle/>
+          <a:p>
+            <a:pPr algn="ctr"/>
+            <a:endParaRPr lang="en-US"/>
+          </a:p>
+        </p:txBody>
+      </p:sp>
+      <p:sp>
+        <p:nvSpPr>
+          <p:cNvPr id="13" name="Rectangle 12">
+            <a:extLst>
+              <a:ext uri="{FF2B5EF4-FFF2-40B4-BE49-F238E27FC236}">
+                <a16:creationId xmlns:a16="http://schemas.microsoft.com/office/drawing/2014/main" id="{EAC3F77E-B018-47BA-A858-85134F406815}"/>
+              </a:ext>
+              <a:ext uri="{C183D7F6-B498-43B3-948B-1728B52AA6E4}">
+                <adec:decorative xmlns:adec="http://schemas.microsoft.com/office/drawing/2017/decorative" val="1"/>
+              </a:ext>
+            </a:extLst>
+          </p:cNvPr>
+          <p:cNvSpPr>
+            <a:spLocks noGrp="1" noRot="1" noChangeAspect="1" noMove="1" noResize="1" noEditPoints="1" noAdjustHandles="1" noChangeArrowheads="1" noChangeShapeType="1" noTextEdit="1"/>
+          </p:cNvSpPr>
+          <p:nvPr>
+            <p:extLst>
+              <p:ext uri="{386F3935-93C4-4BCD-93E2-E3B085C9AB24}">
+                <p16:designElem xmlns:p16="http://schemas.microsoft.com/office/powerpoint/2015/main" val="1"/>
+              </p:ext>
+            </p:extLst>
+          </p:nvPr>
+        </p:nvSpPr>
+        <p:spPr>
+          <a:xfrm>
+            <a:off x="477012" y="480060"/>
+            <a:ext cx="11237976" cy="5897880"/>
+          </a:xfrm>
+          <a:prstGeom prst="rect">
+            <a:avLst/>
+          </a:prstGeom>
+          <a:solidFill>
+            <a:srgbClr val="FFFFFF"/>
+          </a:solidFill>
+          <a:ln>
+            <a:noFill/>
+          </a:ln>
+        </p:spPr>
+        <p:style>
+          <a:lnRef idx="2">
+            <a:schemeClr val="accent1">
+              <a:shade val="50000"/>
+            </a:schemeClr>
+          </a:lnRef>
+          <a:fillRef idx="1">
+            <a:schemeClr val="accent1"/>
+          </a:fillRef>
+          <a:effectRef idx="0">
+            <a:schemeClr val="accent1"/>
+          </a:effectRef>
+          <a:fontRef idx="minor">
+            <a:schemeClr val="lt1"/>
+          </a:fontRef>
+        </p:style>
+        <p:txBody>
+          <a:bodyPr rtlCol="0" anchor="ctr"/>
+          <a:lstStyle/>
+          <a:p>
+            <a:pPr algn="ctr"/>
+            <a:endParaRPr lang="en-US"/>
+          </a:p>
+        </p:txBody>
+      </p:sp>
+      <p:pic>
+        <p:nvPicPr>
+          <p:cNvPr id="15" name="Picture 14">
+            <a:extLst>
+              <a:ext uri="{FF2B5EF4-FFF2-40B4-BE49-F238E27FC236}">
+                <a16:creationId xmlns:a16="http://schemas.microsoft.com/office/drawing/2014/main" id="{8DA1FCE1-F95B-47B3-8199-671E0CFD98CC}"/>
+              </a:ext>
+            </a:extLst>
+          </p:cNvPr>
+          <p:cNvPicPr>
+            <a:picLocks noChangeAspect="1"/>
+          </p:cNvPicPr>
+          <p:nvPr/>
+        </p:nvPicPr>
+        <p:blipFill>
+          <a:blip r:embed="rId3"/>
+          <a:stretch>
+            <a:fillRect/>
+          </a:stretch>
+        </p:blipFill>
+        <p:spPr>
+          <a:xfrm>
+            <a:off x="314398" y="280304"/>
+            <a:ext cx="6242177" cy="4465141"/>
+          </a:xfrm>
+          <a:prstGeom prst="rect">
+            <a:avLst/>
+          </a:prstGeom>
+        </p:spPr>
+      </p:pic>
+      <p:pic>
+        <p:nvPicPr>
+          <p:cNvPr id="17" name="Picture 16">
+            <a:extLst>
+              <a:ext uri="{FF2B5EF4-FFF2-40B4-BE49-F238E27FC236}">
+                <a16:creationId xmlns:a16="http://schemas.microsoft.com/office/drawing/2014/main" id="{8A2FBDED-A24F-4FF2-9194-238B734480A6}"/>
+              </a:ext>
+            </a:extLst>
+          </p:cNvPr>
+          <p:cNvPicPr>
+            <a:picLocks noChangeAspect="1"/>
+          </p:cNvPicPr>
+          <p:nvPr/>
+        </p:nvPicPr>
+        <p:blipFill>
+          <a:blip r:embed="rId4"/>
+          <a:stretch>
+            <a:fillRect/>
+          </a:stretch>
+        </p:blipFill>
+        <p:spPr>
+          <a:xfrm>
+            <a:off x="6475536" y="2502596"/>
+            <a:ext cx="5553850" cy="4115374"/>
+          </a:xfrm>
+          <a:prstGeom prst="rect">
+            <a:avLst/>
+          </a:prstGeom>
+        </p:spPr>
+      </p:pic>
+      <p:grpSp>
+        <p:nvGrpSpPr>
+          <p:cNvPr id="18" name="Group 17">
+            <a:extLst>
+              <a:ext uri="{FF2B5EF4-FFF2-40B4-BE49-F238E27FC236}">
+                <a16:creationId xmlns:a16="http://schemas.microsoft.com/office/drawing/2014/main" id="{1D93ED7D-5FCD-4097-B8A7-05DE0B3C62A7}"/>
+              </a:ext>
+            </a:extLst>
+          </p:cNvPr>
+          <p:cNvGrpSpPr/>
+          <p:nvPr/>
+        </p:nvGrpSpPr>
+        <p:grpSpPr>
+          <a:xfrm>
+            <a:off x="7782318" y="4501326"/>
+            <a:ext cx="491762" cy="1774807"/>
+            <a:chOff x="7477518" y="4260026"/>
+            <a:chExt cx="491762" cy="1774807"/>
+          </a:xfrm>
+        </p:grpSpPr>
+        <p:grpSp>
+          <p:nvGrpSpPr>
+            <p:cNvPr id="19" name="Group 18">
+              <a:extLst>
+                <a:ext uri="{FF2B5EF4-FFF2-40B4-BE49-F238E27FC236}">
+                  <a16:creationId xmlns:a16="http://schemas.microsoft.com/office/drawing/2014/main" id="{92401260-3763-44FB-B140-2D41F2803882}"/>
+                </a:ext>
+              </a:extLst>
+            </p:cNvPr>
+            <p:cNvGrpSpPr/>
+            <p:nvPr/>
+          </p:nvGrpSpPr>
+          <p:grpSpPr>
+            <a:xfrm rot="10800000">
+              <a:off x="7482083" y="4260026"/>
+              <a:ext cx="487197" cy="1774807"/>
+              <a:chOff x="2152359" y="1194200"/>
+              <a:chExt cx="487197" cy="4564665"/>
+            </a:xfrm>
+          </p:grpSpPr>
+          <p:sp>
+            <p:nvSpPr>
+              <p:cNvPr id="21" name="Arrow: Left 20">
+                <a:extLst>
+                  <a:ext uri="{FF2B5EF4-FFF2-40B4-BE49-F238E27FC236}">
+                    <a16:creationId xmlns:a16="http://schemas.microsoft.com/office/drawing/2014/main" id="{2CA995B9-8CB9-40EF-8146-3C2BA8383515}"/>
+                  </a:ext>
+                </a:extLst>
+              </p:cNvPr>
+              <p:cNvSpPr/>
+              <p:nvPr/>
+            </p:nvSpPr>
+            <p:spPr>
+              <a:xfrm rot="10800000">
+                <a:off x="2169293" y="5484544"/>
+                <a:ext cx="470263" cy="274321"/>
+              </a:xfrm>
+              <a:prstGeom prst="leftArrow">
+                <a:avLst/>
+              </a:prstGeom>
+            </p:spPr>
+            <p:style>
+              <a:lnRef idx="2">
+                <a:schemeClr val="dk1">
+                  <a:shade val="50000"/>
+                </a:schemeClr>
+              </a:lnRef>
+              <a:fillRef idx="1">
+                <a:schemeClr val="dk1"/>
+              </a:fillRef>
+              <a:effectRef idx="0">
+                <a:schemeClr val="dk1"/>
+              </a:effectRef>
+              <a:fontRef idx="minor">
+                <a:schemeClr val="lt1"/>
+              </a:fontRef>
+            </p:style>
+            <p:txBody>
+              <a:bodyPr rtlCol="0" anchor="ctr"/>
+              <a:lstStyle/>
+              <a:p>
+                <a:pPr algn="ctr"/>
+                <a:endParaRPr lang="en-AU"/>
+              </a:p>
+            </p:txBody>
+          </p:sp>
+          <p:sp>
+            <p:nvSpPr>
+              <p:cNvPr id="22" name="Arrow: Left 21">
+                <a:extLst>
+                  <a:ext uri="{FF2B5EF4-FFF2-40B4-BE49-F238E27FC236}">
+                    <a16:creationId xmlns:a16="http://schemas.microsoft.com/office/drawing/2014/main" id="{AF2B90AF-15C8-43C5-AFF1-314A16BEF268}"/>
+                  </a:ext>
+                </a:extLst>
+              </p:cNvPr>
+              <p:cNvSpPr/>
+              <p:nvPr/>
+            </p:nvSpPr>
+            <p:spPr>
+              <a:xfrm rot="10800000">
+                <a:off x="2169293" y="2957862"/>
+                <a:ext cx="470263" cy="274321"/>
+              </a:xfrm>
+              <a:prstGeom prst="leftArrow">
+                <a:avLst/>
+              </a:prstGeom>
+            </p:spPr>
+            <p:style>
+              <a:lnRef idx="2">
+                <a:schemeClr val="dk1">
+                  <a:shade val="50000"/>
+                </a:schemeClr>
+              </a:lnRef>
+              <a:fillRef idx="1">
+                <a:schemeClr val="dk1"/>
+              </a:fillRef>
+              <a:effectRef idx="0">
+                <a:schemeClr val="dk1"/>
+              </a:effectRef>
+              <a:fontRef idx="minor">
+                <a:schemeClr val="lt1"/>
+              </a:fontRef>
+            </p:style>
+            <p:txBody>
+              <a:bodyPr rtlCol="0" anchor="ctr"/>
+              <a:lstStyle/>
+              <a:p>
+                <a:pPr algn="ctr"/>
+                <a:endParaRPr lang="en-AU"/>
+              </a:p>
+            </p:txBody>
+          </p:sp>
+          <p:sp>
+            <p:nvSpPr>
+              <p:cNvPr id="23" name="Arrow: Left 22">
+                <a:extLst>
+                  <a:ext uri="{FF2B5EF4-FFF2-40B4-BE49-F238E27FC236}">
+                    <a16:creationId xmlns:a16="http://schemas.microsoft.com/office/drawing/2014/main" id="{08E8EA0E-9C38-41AA-A757-B8705CF3304C}"/>
+                  </a:ext>
+                </a:extLst>
+              </p:cNvPr>
+              <p:cNvSpPr/>
+              <p:nvPr/>
+            </p:nvSpPr>
+            <p:spPr>
+              <a:xfrm rot="10800000">
+                <a:off x="2152359" y="1194200"/>
+                <a:ext cx="470263" cy="274321"/>
+              </a:xfrm>
+              <a:prstGeom prst="leftArrow">
+                <a:avLst/>
+              </a:prstGeom>
+            </p:spPr>
+            <p:style>
+              <a:lnRef idx="2">
+                <a:schemeClr val="dk1">
+                  <a:shade val="50000"/>
+                </a:schemeClr>
+              </a:lnRef>
+              <a:fillRef idx="1">
+                <a:schemeClr val="dk1"/>
+              </a:fillRef>
+              <a:effectRef idx="0">
+                <a:schemeClr val="dk1"/>
+              </a:effectRef>
+              <a:fontRef idx="minor">
+                <a:schemeClr val="lt1"/>
+              </a:fontRef>
+            </p:style>
+            <p:txBody>
+              <a:bodyPr rtlCol="0" anchor="ctr"/>
+              <a:lstStyle/>
+              <a:p>
+                <a:pPr algn="ctr"/>
+                <a:endParaRPr lang="en-AU"/>
+              </a:p>
+            </p:txBody>
+          </p:sp>
+        </p:grpSp>
+        <p:sp>
+          <p:nvSpPr>
+            <p:cNvPr id="20" name="Arrow: Left 19">
+              <a:extLst>
+                <a:ext uri="{FF2B5EF4-FFF2-40B4-BE49-F238E27FC236}">
+                  <a16:creationId xmlns:a16="http://schemas.microsoft.com/office/drawing/2014/main" id="{4EB9E173-AD8F-4679-88E0-CC92375473FF}"/>
+                </a:ext>
+              </a:extLst>
+            </p:cNvPr>
+            <p:cNvSpPr/>
+            <p:nvPr/>
+          </p:nvSpPr>
+          <p:spPr>
+            <a:xfrm>
+              <a:off x="7477518" y="4876930"/>
+              <a:ext cx="470263" cy="106660"/>
+            </a:xfrm>
+            <a:prstGeom prst="leftArrow">
+              <a:avLst/>
+            </a:prstGeom>
+          </p:spPr>
+          <p:style>
+            <a:lnRef idx="2">
+              <a:schemeClr val="dk1">
+                <a:shade val="50000"/>
+              </a:schemeClr>
+            </a:lnRef>
+            <a:fillRef idx="1">
+              <a:schemeClr val="dk1"/>
+            </a:fillRef>
+            <a:effectRef idx="0">
+              <a:schemeClr val="dk1"/>
+            </a:effectRef>
+            <a:fontRef idx="minor">
+              <a:schemeClr val="lt1"/>
+            </a:fontRef>
+          </p:style>
+          <p:txBody>
+            <a:bodyPr rtlCol="0" anchor="ctr"/>
+            <a:lstStyle/>
+            <a:p>
+              <a:pPr algn="ctr"/>
+              <a:endParaRPr lang="en-AU"/>
+            </a:p>
+          </p:txBody>
+        </p:sp>
+      </p:grpSp>
     </p:spTree>
     <p:extLst>
       <p:ext uri="{BB962C8B-B14F-4D97-AF65-F5344CB8AC3E}">
         <p14:creationId xmlns:p14="http://schemas.microsoft.com/office/powerpoint/2010/main" val="182177130"/>
+      </p:ext>
+    </p:extLst>
+  </p:cSld>
+  <p:clrMapOvr>
+    <a:masterClrMapping/>
+  </p:clrMapOvr>
+  <p:timing>
+    <p:tnLst>
+      <p:par>
+        <p:cTn id="1" dur="indefinite" restart="never" nodeType="tmRoot">
+          <p:childTnLst>
+            <p:seq concurrent="1" nextAc="seek">
+              <p:cTn id="2" dur="indefinite" nodeType="mainSeq">
+                <p:childTnLst>
+                  <p:par>
+                    <p:cTn id="3" fill="hold">
+                      <p:stCondLst>
+                        <p:cond delay="indefinite"/>
+                      </p:stCondLst>
+                      <p:childTnLst>
+                        <p:par>
+                          <p:cTn id="4" fill="hold">
+                            <p:stCondLst>
+                              <p:cond delay="0"/>
+                            </p:stCondLst>
+                            <p:childTnLst>
+                              <p:par>
+                                <p:cTn id="5" presetID="1" presetClass="entr" presetSubtype="0" fill="hold" nodeType="clickEffect">
+                                  <p:stCondLst>
+                                    <p:cond delay="0"/>
+                                  </p:stCondLst>
+                                  <p:childTnLst>
+                                    <p:set>
+                                      <p:cBhvr>
+                                        <p:cTn id="6" dur="1" fill="hold">
+                                          <p:stCondLst>
+                                            <p:cond delay="0"/>
+                                          </p:stCondLst>
+                                        </p:cTn>
+                                        <p:tgtEl>
+                                          <p:spTgt spid="17"/>
+                                        </p:tgtEl>
+                                        <p:attrNameLst>
+                                          <p:attrName>style.visibility</p:attrName>
+                                        </p:attrNameLst>
+                                      </p:cBhvr>
+                                      <p:to>
+                                        <p:strVal val="visible"/>
+                                      </p:to>
+                                    </p:set>
+                                  </p:childTnLst>
+                                </p:cTn>
+                              </p:par>
+                            </p:childTnLst>
+                          </p:cTn>
+                        </p:par>
+                      </p:childTnLst>
+                    </p:cTn>
+                  </p:par>
+                  <p:par>
+                    <p:cTn id="7" fill="hold">
+                      <p:stCondLst>
+                        <p:cond delay="indefinite"/>
+                      </p:stCondLst>
+                      <p:childTnLst>
+                        <p:par>
+                          <p:cTn id="8" fill="hold">
+                            <p:stCondLst>
+                              <p:cond delay="0"/>
+                            </p:stCondLst>
+                            <p:childTnLst>
+                              <p:par>
+                                <p:cTn id="9" presetID="1" presetClass="entr" presetSubtype="0" fill="hold" nodeType="clickEffect">
+                                  <p:stCondLst>
+                                    <p:cond delay="0"/>
+                                  </p:stCondLst>
+                                  <p:childTnLst>
+                                    <p:set>
+                                      <p:cBhvr>
+                                        <p:cTn id="10" dur="1" fill="hold">
+                                          <p:stCondLst>
+                                            <p:cond delay="0"/>
+                                          </p:stCondLst>
+                                        </p:cTn>
+                                        <p:tgtEl>
+                                          <p:spTgt spid="18"/>
+                                        </p:tgtEl>
+                                        <p:attrNameLst>
+                                          <p:attrName>style.visibility</p:attrName>
+                                        </p:attrNameLst>
+                                      </p:cBhvr>
+                                      <p:to>
+                                        <p:strVal val="visible"/>
+                                      </p:to>
+                                    </p:set>
+                                  </p:childTnLst>
+                                </p:cTn>
+                              </p:par>
+                            </p:childTnLst>
+                          </p:cTn>
+                        </p:par>
+                      </p:childTnLst>
+                    </p:cTn>
+                  </p:par>
+                </p:childTnLst>
+              </p:cTn>
+              <p:prevCondLst>
+                <p:cond evt="onPrev" delay="0">
+                  <p:tgtEl>
+                    <p:sldTgt/>
+                  </p:tgtEl>
+                </p:cond>
+              </p:prevCondLst>
+              <p:nextCondLst>
+                <p:cond evt="onNext" delay="0">
+                  <p:tgtEl>
+                    <p:sldTgt/>
+                  </p:tgtEl>
+                </p:cond>
+              </p:nextCondLst>
+            </p:seq>
+          </p:childTnLst>
+        </p:cTn>
+      </p:par>
+    </p:tnLst>
+  </p:timing>
+</p:sld>
+</file>
+
+<file path=ppt/slides/slide6.xml><?xml version="1.0" encoding="utf-8"?>
+<p:sld xmlns:a="http://schemas.openxmlformats.org/drawingml/2006/main" xmlns:r="http://schemas.openxmlformats.org/officeDocument/2006/relationships" xmlns:p="http://schemas.openxmlformats.org/presentationml/2006/main">
+  <p:cSld>
+    <p:bg>
+      <p:bgPr>
+        <a:solidFill>
+          <a:schemeClr val="bg1"/>
+        </a:solidFill>
+        <a:effectLst/>
+      </p:bgPr>
+    </p:bg>
+    <p:spTree>
+      <p:nvGrpSpPr>
+        <p:cNvPr id="1" name=""/>
+        <p:cNvGrpSpPr/>
+        <p:nvPr/>
+      </p:nvGrpSpPr>
+      <p:grpSpPr>
+        <a:xfrm>
+          <a:off x="0" y="0"/>
+          <a:ext cx="0" cy="0"/>
+          <a:chOff x="0" y="0"/>
+          <a:chExt cx="0" cy="0"/>
+        </a:xfrm>
+      </p:grpSpPr>
+      <p:sp>
+        <p:nvSpPr>
+          <p:cNvPr id="14" name="Rectangle 13">
+            <a:extLst>
+              <a:ext uri="{FF2B5EF4-FFF2-40B4-BE49-F238E27FC236}">
+                <a16:creationId xmlns:a16="http://schemas.microsoft.com/office/drawing/2014/main" id="{32BC26D8-82FB-445E-AA49-62A77D7C1EE0}"/>
+              </a:ext>
+              <a:ext uri="{C183D7F6-B498-43B3-948B-1728B52AA6E4}">
+                <adec:decorative xmlns:adec="http://schemas.microsoft.com/office/drawing/2017/decorative" val="1"/>
+              </a:ext>
+            </a:extLst>
+          </p:cNvPr>
+          <p:cNvSpPr>
+            <a:spLocks noGrp="1" noRot="1" noChangeAspect="1" noMove="1" noResize="1" noEditPoints="1" noAdjustHandles="1" noChangeArrowheads="1" noChangeShapeType="1" noTextEdit="1"/>
+          </p:cNvSpPr>
+          <p:nvPr>
+            <p:extLst>
+              <p:ext uri="{386F3935-93C4-4BCD-93E2-E3B085C9AB24}">
+                <p16:designElem xmlns:p16="http://schemas.microsoft.com/office/powerpoint/2015/main" val="1"/>
+              </p:ext>
+            </p:extLst>
+          </p:nvPr>
+        </p:nvSpPr>
+        <p:spPr>
+          <a:xfrm>
+            <a:off x="0" y="0"/>
+            <a:ext cx="12192000" cy="6858000"/>
+          </a:xfrm>
+          <a:prstGeom prst="rect">
+            <a:avLst/>
+          </a:prstGeom>
+          <a:solidFill>
+            <a:srgbClr val="7C0F39"/>
+          </a:solidFill>
+          <a:ln>
+            <a:noFill/>
+          </a:ln>
+        </p:spPr>
+        <p:style>
+          <a:lnRef idx="2">
+            <a:schemeClr val="accent1">
+              <a:shade val="50000"/>
+            </a:schemeClr>
+          </a:lnRef>
+          <a:fillRef idx="1">
+            <a:schemeClr val="accent1"/>
+          </a:fillRef>
+          <a:effectRef idx="0">
+            <a:schemeClr val="accent1"/>
+          </a:effectRef>
+          <a:fontRef idx="minor">
+            <a:schemeClr val="lt1"/>
+          </a:fontRef>
+        </p:style>
+        <p:txBody>
+          <a:bodyPr rtlCol="0" anchor="ctr"/>
+          <a:lstStyle/>
+          <a:p>
+            <a:pPr algn="ctr"/>
+            <a:endParaRPr lang="en-US"/>
+          </a:p>
+        </p:txBody>
+      </p:sp>
+      <p:sp>
+        <p:nvSpPr>
+          <p:cNvPr id="16" name="Rectangle 15">
+            <a:extLst>
+              <a:ext uri="{FF2B5EF4-FFF2-40B4-BE49-F238E27FC236}">
+                <a16:creationId xmlns:a16="http://schemas.microsoft.com/office/drawing/2014/main" id="{CB44330D-EA18-4254-AA95-EB49948539B8}"/>
+              </a:ext>
+              <a:ext uri="{C183D7F6-B498-43B3-948B-1728B52AA6E4}">
+                <adec:decorative xmlns:adec="http://schemas.microsoft.com/office/drawing/2017/decorative" val="1"/>
+              </a:ext>
+            </a:extLst>
+          </p:cNvPr>
+          <p:cNvSpPr>
+            <a:spLocks noGrp="1" noRot="1" noChangeAspect="1" noMove="1" noResize="1" noEditPoints="1" noAdjustHandles="1" noChangeArrowheads="1" noChangeShapeType="1" noTextEdit="1"/>
+          </p:cNvSpPr>
+          <p:nvPr>
+            <p:extLst>
+              <p:ext uri="{386F3935-93C4-4BCD-93E2-E3B085C9AB24}">
+                <p16:designElem xmlns:p16="http://schemas.microsoft.com/office/powerpoint/2015/main" val="1"/>
+              </p:ext>
+            </p:extLst>
+          </p:nvPr>
+        </p:nvSpPr>
+        <p:spPr>
+          <a:xfrm>
+            <a:off x="477012" y="480060"/>
+            <a:ext cx="11237976" cy="5897880"/>
+          </a:xfrm>
+          <a:prstGeom prst="rect">
+            <a:avLst/>
+          </a:prstGeom>
+          <a:solidFill>
+            <a:srgbClr val="FFFFFF"/>
+          </a:solidFill>
+          <a:ln>
+            <a:noFill/>
+          </a:ln>
+        </p:spPr>
+        <p:style>
+          <a:lnRef idx="2">
+            <a:schemeClr val="accent1">
+              <a:shade val="50000"/>
+            </a:schemeClr>
+          </a:lnRef>
+          <a:fillRef idx="1">
+            <a:schemeClr val="accent1"/>
+          </a:fillRef>
+          <a:effectRef idx="0">
+            <a:schemeClr val="accent1"/>
+          </a:effectRef>
+          <a:fontRef idx="minor">
+            <a:schemeClr val="lt1"/>
+          </a:fontRef>
+        </p:style>
+        <p:txBody>
+          <a:bodyPr rtlCol="0" anchor="ctr"/>
+          <a:lstStyle/>
+          <a:p>
+            <a:pPr algn="ctr"/>
+            <a:endParaRPr lang="en-US"/>
+          </a:p>
+        </p:txBody>
+      </p:sp>
+      <p:pic>
+        <p:nvPicPr>
+          <p:cNvPr id="2" name="Online Media 1" title="Litho boundary - detection interactive notebook test">
+            <a:hlinkClick r:id="" action="ppaction://media"/>
+            <a:extLst>
+              <a:ext uri="{FF2B5EF4-FFF2-40B4-BE49-F238E27FC236}">
+                <a16:creationId xmlns:a16="http://schemas.microsoft.com/office/drawing/2014/main" id="{89B32400-8101-4A84-B836-5BE57D518522}"/>
+              </a:ext>
+            </a:extLst>
+          </p:cNvPr>
+          <p:cNvPicPr>
+            <a:picLocks noRot="1" noChangeAspect="1"/>
+          </p:cNvPicPr>
+          <p:nvPr>
+            <a:videoFile r:link="rId1"/>
+          </p:nvPr>
+        </p:nvPicPr>
+        <p:blipFill>
+          <a:blip r:embed="rId4"/>
+          <a:stretch>
+            <a:fillRect/>
+          </a:stretch>
+        </p:blipFill>
+        <p:spPr>
+          <a:xfrm>
+            <a:off x="477012" y="480060"/>
+            <a:ext cx="10485120" cy="5897880"/>
+          </a:xfrm>
+          <a:prstGeom prst="rect">
+            <a:avLst/>
+          </a:prstGeom>
+        </p:spPr>
+      </p:pic>
+    </p:spTree>
+    <p:extLst>
+      <p:ext uri="{BB962C8B-B14F-4D97-AF65-F5344CB8AC3E}">
+        <p14:creationId xmlns:p14="http://schemas.microsoft.com/office/powerpoint/2010/main" val="355393289"/>
+      </p:ext>
+    </p:extLst>
+  </p:cSld>
+  <p:clrMapOvr>
+    <a:masterClrMapping/>
+  </p:clrMapOvr>
+  <p:timing>
+    <p:tnLst>
+      <p:par>
+        <p:cTn id="1" dur="indefinite" restart="never" nodeType="tmRoot">
+          <p:childTnLst>
+            <p:seq concurrent="1" nextAc="seek">
+              <p:cTn id="2" dur="indefinite" nodeType="mainSeq">
+                <p:childTnLst>
+                  <p:par>
+                    <p:cTn id="3" fill="hold">
+                      <p:stCondLst>
+                        <p:cond delay="indefinite"/>
+                      </p:stCondLst>
+                      <p:childTnLst>
+                        <p:par>
+                          <p:cTn id="4" fill="hold">
+                            <p:stCondLst>
+                              <p:cond delay="0"/>
+                            </p:stCondLst>
+                            <p:childTnLst>
+                              <p:par>
+                                <p:cTn id="5" presetID="1" presetClass="mediacall" presetSubtype="0" fill="hold" nodeType="clickEffect">
+                                  <p:stCondLst>
+                                    <p:cond delay="0"/>
+                                  </p:stCondLst>
+                                  <p:childTnLst>
+                                    <p:cmd type="call" cmd="playFrom(0.0)">
+                                      <p:cBhvr>
+                                        <p:cTn id="6" dur="1" fill="hold"/>
+                                        <p:tgtEl>
+                                          <p:spTgt spid="2"/>
+                                        </p:tgtEl>
+                                      </p:cBhvr>
+                                    </p:cmd>
+                                  </p:childTnLst>
+                                </p:cTn>
+                              </p:par>
+                            </p:childTnLst>
+                          </p:cTn>
+                        </p:par>
+                      </p:childTnLst>
+                    </p:cTn>
+                  </p:par>
+                </p:childTnLst>
+              </p:cTn>
+              <p:prevCondLst>
+                <p:cond evt="onPrev" delay="0">
+                  <p:tgtEl>
+                    <p:sldTgt/>
+                  </p:tgtEl>
+                </p:cond>
+              </p:prevCondLst>
+              <p:nextCondLst>
+                <p:cond evt="onNext" delay="0">
+                  <p:tgtEl>
+                    <p:sldTgt/>
+                  </p:tgtEl>
+                </p:cond>
+              </p:nextCondLst>
+            </p:seq>
+            <p:video>
+              <p:cMediaNode vol="80000">
+                <p:cTn id="7" fill="hold" display="0">
+                  <p:stCondLst>
+                    <p:cond delay="indefinite"/>
+                  </p:stCondLst>
+                </p:cTn>
+                <p:tgtEl>
+                  <p:spTgt spid="2"/>
+                </p:tgtEl>
+              </p:cMediaNode>
+            </p:video>
+            <p:seq concurrent="1" nextAc="seek">
+              <p:cTn id="8" restart="whenNotActive" fill="hold" evtFilter="cancelBubble" nodeType="interactiveSeq">
+                <p:stCondLst>
+                  <p:cond evt="onClick" delay="0">
+                    <p:tgtEl>
+                      <p:spTgt spid="2"/>
+                    </p:tgtEl>
+                  </p:cond>
+                </p:stCondLst>
+                <p:endSync evt="end" delay="0">
+                  <p:rtn val="all"/>
+                </p:endSync>
+                <p:childTnLst>
+                  <p:par>
+                    <p:cTn id="9" fill="hold">
+                      <p:stCondLst>
+                        <p:cond delay="0"/>
+                      </p:stCondLst>
+                      <p:childTnLst>
+                        <p:par>
+                          <p:cTn id="10" fill="hold">
+                            <p:stCondLst>
+                              <p:cond delay="0"/>
+                            </p:stCondLst>
+                            <p:childTnLst>
+                              <p:par>
+                                <p:cTn id="11" presetID="2" presetClass="mediacall" presetSubtype="0" fill="hold" nodeType="clickEffect">
+                                  <p:stCondLst>
+                                    <p:cond delay="0"/>
+                                  </p:stCondLst>
+                                  <p:childTnLst>
+                                    <p:cmd type="call" cmd="togglePause">
+                                      <p:cBhvr>
+                                        <p:cTn id="12" dur="1" fill="hold"/>
+                                        <p:tgtEl>
+                                          <p:spTgt spid="2"/>
+                                        </p:tgtEl>
+                                      </p:cBhvr>
+                                    </p:cmd>
+                                  </p:childTnLst>
+                                </p:cTn>
+                              </p:par>
+                            </p:childTnLst>
+                          </p:cTn>
+                        </p:par>
+                      </p:childTnLst>
+                    </p:cTn>
+                  </p:par>
+                </p:childTnLst>
+              </p:cTn>
+              <p:nextCondLst>
+                <p:cond evt="onClick" delay="0">
+                  <p:tgtEl>
+                    <p:spTgt spid="2"/>
+                  </p:tgtEl>
+                </p:cond>
+              </p:nextCondLst>
+            </p:seq>
+          </p:childTnLst>
+        </p:cTn>
+      </p:par>
+    </p:tnLst>
+  </p:timing>
+</p:sld>
+</file>
+
+<file path=ppt/slides/slide7.xml><?xml version="1.0" encoding="utf-8"?>
+<p:sld xmlns:a="http://schemas.openxmlformats.org/drawingml/2006/main" xmlns:r="http://schemas.openxmlformats.org/officeDocument/2006/relationships" xmlns:p="http://schemas.openxmlformats.org/presentationml/2006/main">
+  <p:cSld>
+    <p:bg>
+      <p:bgPr>
+        <a:solidFill>
+          <a:schemeClr val="bg1"/>
+        </a:solidFill>
+        <a:effectLst/>
+      </p:bgPr>
+    </p:bg>
+    <p:spTree>
+      <p:nvGrpSpPr>
+        <p:cNvPr id="1" name=""/>
+        <p:cNvGrpSpPr/>
+        <p:nvPr/>
+      </p:nvGrpSpPr>
+      <p:grpSpPr>
+        <a:xfrm>
+          <a:off x="0" y="0"/>
+          <a:ext cx="0" cy="0"/>
+          <a:chOff x="0" y="0"/>
+          <a:chExt cx="0" cy="0"/>
+        </a:xfrm>
+      </p:grpSpPr>
+      <p:sp>
+        <p:nvSpPr>
+          <p:cNvPr id="14" name="Rectangle 13">
+            <a:extLst>
+              <a:ext uri="{FF2B5EF4-FFF2-40B4-BE49-F238E27FC236}">
+                <a16:creationId xmlns:a16="http://schemas.microsoft.com/office/drawing/2014/main" id="{32BC26D8-82FB-445E-AA49-62A77D7C1EE0}"/>
+              </a:ext>
+              <a:ext uri="{C183D7F6-B498-43B3-948B-1728B52AA6E4}">
+                <adec:decorative xmlns:adec="http://schemas.microsoft.com/office/drawing/2017/decorative" val="1"/>
+              </a:ext>
+            </a:extLst>
+          </p:cNvPr>
+          <p:cNvSpPr>
+            <a:spLocks noGrp="1" noRot="1" noChangeAspect="1" noMove="1" noResize="1" noEditPoints="1" noAdjustHandles="1" noChangeArrowheads="1" noChangeShapeType="1" noTextEdit="1"/>
+          </p:cNvSpPr>
+          <p:nvPr>
+            <p:extLst>
+              <p:ext uri="{386F3935-93C4-4BCD-93E2-E3B085C9AB24}">
+                <p16:designElem xmlns:p16="http://schemas.microsoft.com/office/powerpoint/2015/main" val="1"/>
+              </p:ext>
+            </p:extLst>
+          </p:nvPr>
+        </p:nvSpPr>
+        <p:spPr>
+          <a:xfrm>
+            <a:off x="0" y="0"/>
+            <a:ext cx="12192000" cy="6858000"/>
+          </a:xfrm>
+          <a:prstGeom prst="rect">
+            <a:avLst/>
+          </a:prstGeom>
+          <a:solidFill>
+            <a:srgbClr val="7C0F39"/>
+          </a:solidFill>
+          <a:ln>
+            <a:noFill/>
+          </a:ln>
+        </p:spPr>
+        <p:style>
+          <a:lnRef idx="2">
+            <a:schemeClr val="accent1">
+              <a:shade val="50000"/>
+            </a:schemeClr>
+          </a:lnRef>
+          <a:fillRef idx="1">
+            <a:schemeClr val="accent1"/>
+          </a:fillRef>
+          <a:effectRef idx="0">
+            <a:schemeClr val="accent1"/>
+          </a:effectRef>
+          <a:fontRef idx="minor">
+            <a:schemeClr val="lt1"/>
+          </a:fontRef>
+        </p:style>
+        <p:txBody>
+          <a:bodyPr rtlCol="0" anchor="ctr"/>
+          <a:lstStyle/>
+          <a:p>
+            <a:pPr algn="ctr"/>
+            <a:endParaRPr lang="en-US"/>
+          </a:p>
+        </p:txBody>
+      </p:sp>
+      <p:sp>
+        <p:nvSpPr>
+          <p:cNvPr id="16" name="Rectangle 15">
+            <a:extLst>
+              <a:ext uri="{FF2B5EF4-FFF2-40B4-BE49-F238E27FC236}">
+                <a16:creationId xmlns:a16="http://schemas.microsoft.com/office/drawing/2014/main" id="{CB44330D-EA18-4254-AA95-EB49948539B8}"/>
+              </a:ext>
+              <a:ext uri="{C183D7F6-B498-43B3-948B-1728B52AA6E4}">
+                <adec:decorative xmlns:adec="http://schemas.microsoft.com/office/drawing/2017/decorative" val="1"/>
+              </a:ext>
+            </a:extLst>
+          </p:cNvPr>
+          <p:cNvSpPr>
+            <a:spLocks noGrp="1" noRot="1" noChangeAspect="1" noMove="1" noResize="1" noEditPoints="1" noAdjustHandles="1" noChangeArrowheads="1" noChangeShapeType="1" noTextEdit="1"/>
+          </p:cNvSpPr>
+          <p:nvPr>
+            <p:extLst>
+              <p:ext uri="{386F3935-93C4-4BCD-93E2-E3B085C9AB24}">
+                <p16:designElem xmlns:p16="http://schemas.microsoft.com/office/powerpoint/2015/main" val="1"/>
+              </p:ext>
+            </p:extLst>
+          </p:nvPr>
+        </p:nvSpPr>
+        <p:spPr>
+          <a:xfrm>
+            <a:off x="477012" y="480060"/>
+            <a:ext cx="11237976" cy="5897880"/>
+          </a:xfrm>
+          <a:prstGeom prst="rect">
+            <a:avLst/>
+          </a:prstGeom>
+          <a:solidFill>
+            <a:srgbClr val="FFFFFF"/>
+          </a:solidFill>
+          <a:ln>
+            <a:noFill/>
+          </a:ln>
+        </p:spPr>
+        <p:style>
+          <a:lnRef idx="2">
+            <a:schemeClr val="accent1">
+              <a:shade val="50000"/>
+            </a:schemeClr>
+          </a:lnRef>
+          <a:fillRef idx="1">
+            <a:schemeClr val="accent1"/>
+          </a:fillRef>
+          <a:effectRef idx="0">
+            <a:schemeClr val="accent1"/>
+          </a:effectRef>
+          <a:fontRef idx="minor">
+            <a:schemeClr val="lt1"/>
+          </a:fontRef>
+        </p:style>
+        <p:txBody>
+          <a:bodyPr rtlCol="0" anchor="ctr"/>
+          <a:lstStyle/>
+          <a:p>
+            <a:pPr algn="ctr"/>
+            <a:endParaRPr lang="en-US"/>
+          </a:p>
+        </p:txBody>
+      </p:sp>
+      <p:sp>
+        <p:nvSpPr>
+          <p:cNvPr id="12" name="Rectangle 11">
+            <a:extLst>
+              <a:ext uri="{FF2B5EF4-FFF2-40B4-BE49-F238E27FC236}">
+                <a16:creationId xmlns:a16="http://schemas.microsoft.com/office/drawing/2014/main" id="{73BA2D3B-A850-4C88-84AD-603B61578EE6}"/>
+              </a:ext>
+              <a:ext uri="{C183D7F6-B498-43B3-948B-1728B52AA6E4}">
+                <adec:decorative xmlns:adec="http://schemas.microsoft.com/office/drawing/2017/decorative" val="1"/>
+              </a:ext>
+            </a:extLst>
+          </p:cNvPr>
+          <p:cNvSpPr>
+            <a:spLocks noGrp="1" noRot="1" noChangeAspect="1" noMove="1" noResize="1" noEditPoints="1" noAdjustHandles="1" noChangeArrowheads="1" noChangeShapeType="1" noTextEdit="1"/>
+          </p:cNvSpPr>
+          <p:nvPr>
+            <p:extLst>
+              <p:ext uri="{386F3935-93C4-4BCD-93E2-E3B085C9AB24}">
+                <p16:designElem xmlns:p16="http://schemas.microsoft.com/office/powerpoint/2015/main" val="1"/>
+              </p:ext>
+            </p:extLst>
+          </p:nvPr>
+        </p:nvSpPr>
+        <p:spPr>
+          <a:xfrm>
+            <a:off x="0" y="0"/>
+            <a:ext cx="12192000" cy="6858000"/>
+          </a:xfrm>
+          <a:prstGeom prst="rect">
+            <a:avLst/>
+          </a:prstGeom>
+          <a:solidFill>
+            <a:srgbClr val="7C0F39"/>
+          </a:solidFill>
+          <a:ln>
+            <a:noFill/>
+          </a:ln>
+        </p:spPr>
+        <p:style>
+          <a:lnRef idx="2">
+            <a:schemeClr val="accent1">
+              <a:shade val="50000"/>
+            </a:schemeClr>
+          </a:lnRef>
+          <a:fillRef idx="1">
+            <a:schemeClr val="accent1"/>
+          </a:fillRef>
+          <a:effectRef idx="0">
+            <a:schemeClr val="accent1"/>
+          </a:effectRef>
+          <a:fontRef idx="minor">
+            <a:schemeClr val="lt1"/>
+          </a:fontRef>
+        </p:style>
+        <p:txBody>
+          <a:bodyPr rtlCol="0" anchor="ctr"/>
+          <a:lstStyle/>
+          <a:p>
+            <a:pPr algn="ctr"/>
+            <a:endParaRPr lang="en-US"/>
+          </a:p>
+        </p:txBody>
+      </p:sp>
+      <p:sp>
+        <p:nvSpPr>
+          <p:cNvPr id="13" name="Rectangle 12">
+            <a:extLst>
+              <a:ext uri="{FF2B5EF4-FFF2-40B4-BE49-F238E27FC236}">
+                <a16:creationId xmlns:a16="http://schemas.microsoft.com/office/drawing/2014/main" id="{EAC3F77E-B018-47BA-A858-85134F406815}"/>
+              </a:ext>
+              <a:ext uri="{C183D7F6-B498-43B3-948B-1728B52AA6E4}">
+                <adec:decorative xmlns:adec="http://schemas.microsoft.com/office/drawing/2017/decorative" val="1"/>
+              </a:ext>
+            </a:extLst>
+          </p:cNvPr>
+          <p:cNvSpPr>
+            <a:spLocks noGrp="1" noRot="1" noChangeAspect="1" noMove="1" noResize="1" noEditPoints="1" noAdjustHandles="1" noChangeArrowheads="1" noChangeShapeType="1" noTextEdit="1"/>
+          </p:cNvSpPr>
+          <p:nvPr>
+            <p:extLst>
+              <p:ext uri="{386F3935-93C4-4BCD-93E2-E3B085C9AB24}">
+                <p16:designElem xmlns:p16="http://schemas.microsoft.com/office/powerpoint/2015/main" val="1"/>
+              </p:ext>
+            </p:extLst>
+          </p:nvPr>
+        </p:nvSpPr>
+        <p:spPr>
+          <a:xfrm>
+            <a:off x="477012" y="480060"/>
+            <a:ext cx="11237976" cy="5897880"/>
+          </a:xfrm>
+          <a:prstGeom prst="rect">
+            <a:avLst/>
+          </a:prstGeom>
+          <a:solidFill>
+            <a:srgbClr val="FFFFFF"/>
+          </a:solidFill>
+          <a:ln>
+            <a:noFill/>
+          </a:ln>
+        </p:spPr>
+        <p:style>
+          <a:lnRef idx="2">
+            <a:schemeClr val="accent1">
+              <a:shade val="50000"/>
+            </a:schemeClr>
+          </a:lnRef>
+          <a:fillRef idx="1">
+            <a:schemeClr val="accent1"/>
+          </a:fillRef>
+          <a:effectRef idx="0">
+            <a:schemeClr val="accent1"/>
+          </a:effectRef>
+          <a:fontRef idx="minor">
+            <a:schemeClr val="lt1"/>
+          </a:fontRef>
+        </p:style>
+        <p:txBody>
+          <a:bodyPr rtlCol="0" anchor="ctr"/>
+          <a:lstStyle/>
+          <a:p>
+            <a:pPr algn="ctr"/>
+            <a:endParaRPr lang="en-US"/>
+          </a:p>
+        </p:txBody>
+      </p:sp>
+      <p:sp>
+        <p:nvSpPr>
+          <p:cNvPr id="24" name="Title 1">
+            <a:extLst>
+              <a:ext uri="{FF2B5EF4-FFF2-40B4-BE49-F238E27FC236}">
+                <a16:creationId xmlns:a16="http://schemas.microsoft.com/office/drawing/2014/main" id="{C9355703-DBAA-4793-9FE0-72DD83C7596F}"/>
+              </a:ext>
+            </a:extLst>
+          </p:cNvPr>
+          <p:cNvSpPr txBox="1">
+            <a:spLocks/>
+          </p:cNvSpPr>
+          <p:nvPr/>
+        </p:nvSpPr>
+        <p:spPr>
+          <a:xfrm>
+            <a:off x="838200" y="365125"/>
+            <a:ext cx="10515600" cy="1325563"/>
+          </a:xfrm>
+          <a:prstGeom prst="rect">
+            <a:avLst/>
+          </a:prstGeom>
+        </p:spPr>
+        <p:txBody>
+          <a:bodyPr vert="horz" lIns="91440" tIns="45720" rIns="91440" bIns="45720" rtlCol="0" anchor="b">
+            <a:normAutofit/>
+          </a:bodyPr>
+          <a:lstStyle>
+            <a:lvl1pPr algn="ctr" defTabSz="914400" rtl="0" eaLnBrk="1" latinLnBrk="0" hangingPunct="1">
+              <a:lnSpc>
+                <a:spcPct val="90000"/>
+              </a:lnSpc>
+              <a:spcBef>
+                <a:spcPct val="0"/>
+              </a:spcBef>
+              <a:buNone/>
+              <a:defRPr sz="6000" kern="1200">
+                <a:solidFill>
+                  <a:schemeClr val="tx1"/>
+                </a:solidFill>
+                <a:latin typeface="+mj-lt"/>
+                <a:ea typeface="+mj-ea"/>
+                <a:cs typeface="+mj-cs"/>
+              </a:defRPr>
+            </a:lvl1pPr>
+          </a:lstStyle>
+          <a:p>
+            <a:pPr algn="l"/>
+            <a:r>
+              <a:rPr lang="en-AU" b="1" dirty="0"/>
+              <a:t>Final wrap up ..</a:t>
+            </a:r>
+          </a:p>
+        </p:txBody>
+      </p:sp>
+    </p:spTree>
+    <p:extLst>
+      <p:ext uri="{BB962C8B-B14F-4D97-AF65-F5344CB8AC3E}">
+        <p14:creationId xmlns:p14="http://schemas.microsoft.com/office/powerpoint/2010/main" val="3368478125"/>
       </p:ext>
     </p:extLst>
   </p:cSld>
@@ -5036,4 +8482,299 @@
     </a:ext>
   </a:extLst>
 </a:theme>
+</file>
+
+<file path=ppt/theme/theme2.xml><?xml version="1.0" encoding="utf-8"?>
+<a:theme xmlns:a="http://schemas.openxmlformats.org/drawingml/2006/main" name="Office Theme">
+  <a:themeElements>
+    <a:clrScheme name="Office">
+      <a:dk1>
+        <a:sysClr val="windowText" lastClr="000000"/>
+      </a:dk1>
+      <a:lt1>
+        <a:sysClr val="window" lastClr="FFFFFF"/>
+      </a:lt1>
+      <a:dk2>
+        <a:srgbClr val="44546A"/>
+      </a:dk2>
+      <a:lt2>
+        <a:srgbClr val="E7E6E6"/>
+      </a:lt2>
+      <a:accent1>
+        <a:srgbClr val="4472C4"/>
+      </a:accent1>
+      <a:accent2>
+        <a:srgbClr val="ED7D31"/>
+      </a:accent2>
+      <a:accent3>
+        <a:srgbClr val="A5A5A5"/>
+      </a:accent3>
+      <a:accent4>
+        <a:srgbClr val="FFC000"/>
+      </a:accent4>
+      <a:accent5>
+        <a:srgbClr val="5B9BD5"/>
+      </a:accent5>
+      <a:accent6>
+        <a:srgbClr val="70AD47"/>
+      </a:accent6>
+      <a:hlink>
+        <a:srgbClr val="0563C1"/>
+      </a:hlink>
+      <a:folHlink>
+        <a:srgbClr val="954F72"/>
+      </a:folHlink>
+    </a:clrScheme>
+    <a:fontScheme name="Office">
+      <a:majorFont>
+        <a:latin typeface="Calibri Light" panose="020F0302020204030204"/>
+        <a:ea typeface=""/>
+        <a:cs typeface=""/>
+        <a:font script="Jpan" typeface="游ゴシック Light"/>
+        <a:font script="Hang" typeface="맑은 고딕"/>
+        <a:font script="Hans" typeface="等线 Light"/>
+        <a:font script="Hant" typeface="新細明體"/>
+        <a:font script="Arab" typeface="Times New Roman"/>
+        <a:font script="Hebr" typeface="Times New Roman"/>
+        <a:font script="Thai" typeface="Angsana New"/>
+        <a:font script="Ethi" typeface="Nyala"/>
+        <a:font script="Beng" typeface="Vrinda"/>
+        <a:font script="Gujr" typeface="Shruti"/>
+        <a:font script="Khmr" typeface="MoolBoran"/>
+        <a:font script="Knda" typeface="Tunga"/>
+        <a:font script="Guru" typeface="Raavi"/>
+        <a:font script="Cans" typeface="Euphemia"/>
+        <a:font script="Cher" typeface="Plantagenet Cherokee"/>
+        <a:font script="Yiii" typeface="Microsoft Yi Baiti"/>
+        <a:font script="Tibt" typeface="Microsoft Himalaya"/>
+        <a:font script="Thaa" typeface="MV Boli"/>
+        <a:font script="Deva" typeface="Mangal"/>
+        <a:font script="Telu" typeface="Gautami"/>
+        <a:font script="Taml" typeface="Latha"/>
+        <a:font script="Syrc" typeface="Estrangelo Edessa"/>
+        <a:font script="Orya" typeface="Kalinga"/>
+        <a:font script="Mlym" typeface="Kartika"/>
+        <a:font script="Laoo" typeface="DokChampa"/>
+        <a:font script="Sinh" typeface="Iskoola Pota"/>
+        <a:font script="Mong" typeface="Mongolian Baiti"/>
+        <a:font script="Viet" typeface="Times New Roman"/>
+        <a:font script="Uigh" typeface="Microsoft Uighur"/>
+        <a:font script="Geor" typeface="Sylfaen"/>
+        <a:font script="Armn" typeface="Arial"/>
+        <a:font script="Bugi" typeface="Leelawadee UI"/>
+        <a:font script="Bopo" typeface="Microsoft JhengHei"/>
+        <a:font script="Java" typeface="Javanese Text"/>
+        <a:font script="Lisu" typeface="Segoe UI"/>
+        <a:font script="Mymr" typeface="Myanmar Text"/>
+        <a:font script="Nkoo" typeface="Ebrima"/>
+        <a:font script="Olck" typeface="Nirmala UI"/>
+        <a:font script="Osma" typeface="Ebrima"/>
+        <a:font script="Phag" typeface="Phagspa"/>
+        <a:font script="Syrn" typeface="Estrangelo Edessa"/>
+        <a:font script="Syrj" typeface="Estrangelo Edessa"/>
+        <a:font script="Syre" typeface="Estrangelo Edessa"/>
+        <a:font script="Sora" typeface="Nirmala UI"/>
+        <a:font script="Tale" typeface="Microsoft Tai Le"/>
+        <a:font script="Talu" typeface="Microsoft New Tai Lue"/>
+        <a:font script="Tfng" typeface="Ebrima"/>
+      </a:majorFont>
+      <a:minorFont>
+        <a:latin typeface="Calibri" panose="020F0502020204030204"/>
+        <a:ea typeface=""/>
+        <a:cs typeface=""/>
+        <a:font script="Jpan" typeface="游ゴシック"/>
+        <a:font script="Hang" typeface="맑은 고딕"/>
+        <a:font script="Hans" typeface="等线"/>
+        <a:font script="Hant" typeface="新細明體"/>
+        <a:font script="Arab" typeface="Arial"/>
+        <a:font script="Hebr" typeface="Arial"/>
+        <a:font script="Thai" typeface="Cordia New"/>
+        <a:font script="Ethi" typeface="Nyala"/>
+        <a:font script="Beng" typeface="Vrinda"/>
+        <a:font script="Gujr" typeface="Shruti"/>
+        <a:font script="Khmr" typeface="DaunPenh"/>
+        <a:font script="Knda" typeface="Tunga"/>
+        <a:font script="Guru" typeface="Raavi"/>
+        <a:font script="Cans" typeface="Euphemia"/>
+        <a:font script="Cher" typeface="Plantagenet Cherokee"/>
+        <a:font script="Yiii" typeface="Microsoft Yi Baiti"/>
+        <a:font script="Tibt" typeface="Microsoft Himalaya"/>
+        <a:font script="Thaa" typeface="MV Boli"/>
+        <a:font script="Deva" typeface="Mangal"/>
+        <a:font script="Telu" typeface="Gautami"/>
+        <a:font script="Taml" typeface="Latha"/>
+        <a:font script="Syrc" typeface="Estrangelo Edessa"/>
+        <a:font script="Orya" typeface="Kalinga"/>
+        <a:font script="Mlym" typeface="Kartika"/>
+        <a:font script="Laoo" typeface="DokChampa"/>
+        <a:font script="Sinh" typeface="Iskoola Pota"/>
+        <a:font script="Mong" typeface="Mongolian Baiti"/>
+        <a:font script="Viet" typeface="Arial"/>
+        <a:font script="Uigh" typeface="Microsoft Uighur"/>
+        <a:font script="Geor" typeface="Sylfaen"/>
+        <a:font script="Armn" typeface="Arial"/>
+        <a:font script="Bugi" typeface="Leelawadee UI"/>
+        <a:font script="Bopo" typeface="Microsoft JhengHei"/>
+        <a:font script="Java" typeface="Javanese Text"/>
+        <a:font script="Lisu" typeface="Segoe UI"/>
+        <a:font script="Mymr" typeface="Myanmar Text"/>
+        <a:font script="Nkoo" typeface="Ebrima"/>
+        <a:font script="Olck" typeface="Nirmala UI"/>
+        <a:font script="Osma" typeface="Ebrima"/>
+        <a:font script="Phag" typeface="Phagspa"/>
+        <a:font script="Syrn" typeface="Estrangelo Edessa"/>
+        <a:font script="Syrj" typeface="Estrangelo Edessa"/>
+        <a:font script="Syre" typeface="Estrangelo Edessa"/>
+        <a:font script="Sora" typeface="Nirmala UI"/>
+        <a:font script="Tale" typeface="Microsoft Tai Le"/>
+        <a:font script="Talu" typeface="Microsoft New Tai Lue"/>
+        <a:font script="Tfng" typeface="Ebrima"/>
+      </a:minorFont>
+    </a:fontScheme>
+    <a:fmtScheme name="Office">
+      <a:fillStyleLst>
+        <a:solidFill>
+          <a:schemeClr val="phClr"/>
+        </a:solidFill>
+        <a:gradFill rotWithShape="1">
+          <a:gsLst>
+            <a:gs pos="0">
+              <a:schemeClr val="phClr">
+                <a:lumMod val="110000"/>
+                <a:satMod val="105000"/>
+                <a:tint val="67000"/>
+              </a:schemeClr>
+            </a:gs>
+            <a:gs pos="50000">
+              <a:schemeClr val="phClr">
+                <a:lumMod val="105000"/>
+                <a:satMod val="103000"/>
+                <a:tint val="73000"/>
+              </a:schemeClr>
+            </a:gs>
+            <a:gs pos="100000">
+              <a:schemeClr val="phClr">
+                <a:lumMod val="105000"/>
+                <a:satMod val="109000"/>
+                <a:tint val="81000"/>
+              </a:schemeClr>
+            </a:gs>
+          </a:gsLst>
+          <a:lin ang="5400000" scaled="0"/>
+        </a:gradFill>
+        <a:gradFill rotWithShape="1">
+          <a:gsLst>
+            <a:gs pos="0">
+              <a:schemeClr val="phClr">
+                <a:satMod val="103000"/>
+                <a:lumMod val="102000"/>
+                <a:tint val="94000"/>
+              </a:schemeClr>
+            </a:gs>
+            <a:gs pos="50000">
+              <a:schemeClr val="phClr">
+                <a:satMod val="110000"/>
+                <a:lumMod val="100000"/>
+                <a:shade val="100000"/>
+              </a:schemeClr>
+            </a:gs>
+            <a:gs pos="100000">
+              <a:schemeClr val="phClr">
+                <a:lumMod val="99000"/>
+                <a:satMod val="120000"/>
+                <a:shade val="78000"/>
+              </a:schemeClr>
+            </a:gs>
+          </a:gsLst>
+          <a:lin ang="5400000" scaled="0"/>
+        </a:gradFill>
+      </a:fillStyleLst>
+      <a:lnStyleLst>
+        <a:ln w="6350" cap="flat" cmpd="sng" algn="ctr">
+          <a:solidFill>
+            <a:schemeClr val="phClr"/>
+          </a:solidFill>
+          <a:prstDash val="solid"/>
+          <a:miter lim="800000"/>
+        </a:ln>
+        <a:ln w="12700" cap="flat" cmpd="sng" algn="ctr">
+          <a:solidFill>
+            <a:schemeClr val="phClr"/>
+          </a:solidFill>
+          <a:prstDash val="solid"/>
+          <a:miter lim="800000"/>
+        </a:ln>
+        <a:ln w="19050" cap="flat" cmpd="sng" algn="ctr">
+          <a:solidFill>
+            <a:schemeClr val="phClr"/>
+          </a:solidFill>
+          <a:prstDash val="solid"/>
+          <a:miter lim="800000"/>
+        </a:ln>
+      </a:lnStyleLst>
+      <a:effectStyleLst>
+        <a:effectStyle>
+          <a:effectLst/>
+        </a:effectStyle>
+        <a:effectStyle>
+          <a:effectLst/>
+        </a:effectStyle>
+        <a:effectStyle>
+          <a:effectLst>
+            <a:outerShdw blurRad="57150" dist="19050" dir="5400000" algn="ctr" rotWithShape="0">
+              <a:srgbClr val="000000">
+                <a:alpha val="63000"/>
+              </a:srgbClr>
+            </a:outerShdw>
+          </a:effectLst>
+        </a:effectStyle>
+      </a:effectStyleLst>
+      <a:bgFillStyleLst>
+        <a:solidFill>
+          <a:schemeClr val="phClr"/>
+        </a:solidFill>
+        <a:solidFill>
+          <a:schemeClr val="phClr">
+            <a:tint val="95000"/>
+            <a:satMod val="170000"/>
+          </a:schemeClr>
+        </a:solidFill>
+        <a:gradFill rotWithShape="1">
+          <a:gsLst>
+            <a:gs pos="0">
+              <a:schemeClr val="phClr">
+                <a:tint val="93000"/>
+                <a:satMod val="150000"/>
+                <a:shade val="98000"/>
+                <a:lumMod val="102000"/>
+              </a:schemeClr>
+            </a:gs>
+            <a:gs pos="50000">
+              <a:schemeClr val="phClr">
+                <a:tint val="98000"/>
+                <a:satMod val="130000"/>
+                <a:shade val="90000"/>
+                <a:lumMod val="103000"/>
+              </a:schemeClr>
+            </a:gs>
+            <a:gs pos="100000">
+              <a:schemeClr val="phClr">
+                <a:shade val="63000"/>
+                <a:satMod val="120000"/>
+              </a:schemeClr>
+            </a:gs>
+          </a:gsLst>
+          <a:lin ang="5400000" scaled="0"/>
+        </a:gradFill>
+      </a:bgFillStyleLst>
+    </a:fmtScheme>
+  </a:themeElements>
+  <a:objectDefaults/>
+  <a:extraClrSchemeLst/>
+  <a:extLst>
+    <a:ext uri="{05A4C25C-085E-4340-85A3-A5531E510DB2}">
+      <thm15:themeFamily xmlns:thm15="http://schemas.microsoft.com/office/thememl/2012/main" name="Office Theme" id="{62F939B6-93AF-4DB8-9C6B-D6C7DFDC589F}" vid="{4A3C46E8-61CC-4603-A589-7422A47A8E4A}"/>
+    </a:ext>
+  </a:extLst>
+</a:theme>
 </file>
</xml_diff>